<commit_message>
fixing decider solver algorithm
</commit_message>
<xml_diff>
--- a/slides/07-NPCIntro.pptx
+++ b/slides/07-NPCIntro.pptx
@@ -5,7 +5,7 @@
     <p:sldMasterId id="2147483660" r:id="rId1"/>
   </p:sldMasterIdLst>
   <p:notesMasterIdLst>
-    <p:notesMasterId r:id="rId43"/>
+    <p:notesMasterId r:id="rId44"/>
   </p:notesMasterIdLst>
   <p:sldIdLst>
     <p:sldId id="645" r:id="rId2"/>
@@ -18,37 +18,38 @@
     <p:sldId id="783" r:id="rId9"/>
     <p:sldId id="784" r:id="rId10"/>
     <p:sldId id="785" r:id="rId11"/>
-    <p:sldId id="786" r:id="rId12"/>
-    <p:sldId id="1109" r:id="rId13"/>
-    <p:sldId id="789" r:id="rId14"/>
-    <p:sldId id="1098" r:id="rId15"/>
-    <p:sldId id="792" r:id="rId16"/>
-    <p:sldId id="799" r:id="rId17"/>
-    <p:sldId id="794" r:id="rId18"/>
-    <p:sldId id="1102" r:id="rId19"/>
-    <p:sldId id="1103" r:id="rId20"/>
-    <p:sldId id="842" r:id="rId21"/>
-    <p:sldId id="268" r:id="rId22"/>
-    <p:sldId id="342" r:id="rId23"/>
-    <p:sldId id="846" r:id="rId24"/>
-    <p:sldId id="1108" r:id="rId25"/>
-    <p:sldId id="315" r:id="rId26"/>
-    <p:sldId id="851" r:id="rId27"/>
-    <p:sldId id="322" r:id="rId28"/>
-    <p:sldId id="312" r:id="rId29"/>
-    <p:sldId id="313" r:id="rId30"/>
-    <p:sldId id="337" r:id="rId31"/>
-    <p:sldId id="336" r:id="rId32"/>
-    <p:sldId id="339" r:id="rId33"/>
-    <p:sldId id="341" r:id="rId34"/>
-    <p:sldId id="1106" r:id="rId35"/>
-    <p:sldId id="343" r:id="rId36"/>
-    <p:sldId id="1107" r:id="rId37"/>
-    <p:sldId id="345" r:id="rId38"/>
-    <p:sldId id="852" r:id="rId39"/>
-    <p:sldId id="1105" r:id="rId40"/>
-    <p:sldId id="276" r:id="rId41"/>
-    <p:sldId id="344" r:id="rId42"/>
+    <p:sldId id="1110" r:id="rId12"/>
+    <p:sldId id="786" r:id="rId13"/>
+    <p:sldId id="1109" r:id="rId14"/>
+    <p:sldId id="789" r:id="rId15"/>
+    <p:sldId id="1098" r:id="rId16"/>
+    <p:sldId id="792" r:id="rId17"/>
+    <p:sldId id="799" r:id="rId18"/>
+    <p:sldId id="794" r:id="rId19"/>
+    <p:sldId id="1102" r:id="rId20"/>
+    <p:sldId id="1103" r:id="rId21"/>
+    <p:sldId id="842" r:id="rId22"/>
+    <p:sldId id="268" r:id="rId23"/>
+    <p:sldId id="342" r:id="rId24"/>
+    <p:sldId id="846" r:id="rId25"/>
+    <p:sldId id="1108" r:id="rId26"/>
+    <p:sldId id="315" r:id="rId27"/>
+    <p:sldId id="851" r:id="rId28"/>
+    <p:sldId id="322" r:id="rId29"/>
+    <p:sldId id="312" r:id="rId30"/>
+    <p:sldId id="313" r:id="rId31"/>
+    <p:sldId id="337" r:id="rId32"/>
+    <p:sldId id="336" r:id="rId33"/>
+    <p:sldId id="339" r:id="rId34"/>
+    <p:sldId id="341" r:id="rId35"/>
+    <p:sldId id="1106" r:id="rId36"/>
+    <p:sldId id="343" r:id="rId37"/>
+    <p:sldId id="1107" r:id="rId38"/>
+    <p:sldId id="345" r:id="rId39"/>
+    <p:sldId id="852" r:id="rId40"/>
+    <p:sldId id="1105" r:id="rId41"/>
+    <p:sldId id="276" r:id="rId42"/>
+    <p:sldId id="344" r:id="rId43"/>
   </p:sldIdLst>
   <p:sldSz cx="12192000" cy="6858000"/>
   <p:notesSz cx="6858000" cy="9144000"/>
@@ -248,7 +249,7 @@
           <a:p>
             <a:fld id="{9A9F7FD5-2840-4607-A4CD-0A8A66D9D61D}" type="datetimeFigureOut">
               <a:rPr lang="en-US" smtClean="0"/>
-              <a:t>11/9/22</a:t>
+              <a:t>11/10/22</a:t>
             </a:fld>
             <a:endParaRPr lang="en-US"/>
           </a:p>
@@ -941,7 +942,7 @@
           <a:p>
             <a:fld id="{088A2421-D2CD-4522-A1BA-E4F59ED821B7}" type="datetime1">
               <a:rPr lang="en-US" smtClean="0"/>
-              <a:t>11/9/22</a:t>
+              <a:t>11/10/22</a:t>
             </a:fld>
             <a:endParaRPr lang="en-US"/>
           </a:p>
@@ -1216,7 +1217,7 @@
           <a:p>
             <a:fld id="{DA91928D-0C55-4D8D-9D16-4C05754E5356}" type="datetime1">
               <a:rPr lang="en-US" smtClean="0"/>
-              <a:t>11/9/22</a:t>
+              <a:t>11/10/22</a:t>
             </a:fld>
             <a:endParaRPr lang="en-US"/>
           </a:p>
@@ -1471,7 +1472,7 @@
           <a:p>
             <a:fld id="{584CEDDD-253B-4C38-A621-35D8BA950C17}" type="datetime1">
               <a:rPr lang="en-US" smtClean="0"/>
-              <a:t>11/9/22</a:t>
+              <a:t>11/10/22</a:t>
             </a:fld>
             <a:endParaRPr lang="en-US"/>
           </a:p>
@@ -1639,7 +1640,7 @@
           <a:p>
             <a:fld id="{BF0967E4-28CB-45C9-B82C-D6B22AD4F0EB}" type="datetime1">
               <a:rPr lang="en-US" smtClean="0"/>
-              <a:t>11/9/22</a:t>
+              <a:t>11/10/22</a:t>
             </a:fld>
             <a:endParaRPr lang="en-US"/>
           </a:p>
@@ -1817,7 +1818,7 @@
           <a:p>
             <a:fld id="{2454C693-B405-44E1-A127-B7CE8B45C1E1}" type="datetime1">
               <a:rPr lang="en-US" smtClean="0"/>
-              <a:t>11/9/22</a:t>
+              <a:t>11/10/22</a:t>
             </a:fld>
             <a:endParaRPr lang="en-US"/>
           </a:p>
@@ -2069,7 +2070,7 @@
           <a:p>
             <a:fld id="{26B28102-2E91-4DD7-8E8B-98B790A12701}" type="datetime1">
               <a:rPr lang="en-US" smtClean="0"/>
-              <a:t>11/9/22</a:t>
+              <a:t>11/10/22</a:t>
             </a:fld>
             <a:endParaRPr lang="en-US"/>
           </a:p>
@@ -2327,7 +2328,7 @@
           <a:p>
             <a:fld id="{0B5AF985-6D44-417A-9881-D208468CBA07}" type="datetime1">
               <a:rPr lang="en-US" smtClean="0"/>
-              <a:t>11/9/22</a:t>
+              <a:t>11/10/22</a:t>
             </a:fld>
             <a:endParaRPr lang="en-US"/>
           </a:p>
@@ -2584,7 +2585,7 @@
           <a:p>
             <a:fld id="{26B28102-2E91-4DD7-8E8B-98B790A12701}" type="datetime1">
               <a:rPr lang="en-US" smtClean="0"/>
-              <a:t>11/9/22</a:t>
+              <a:t>11/10/22</a:t>
             </a:fld>
             <a:endParaRPr lang="en-US"/>
           </a:p>
@@ -2830,7 +2831,7 @@
           <a:p>
             <a:fld id="{3A604A86-E8D2-4E57-8D6D-61E2D175474B}" type="datetime1">
               <a:rPr lang="en-US" smtClean="0"/>
-              <a:t>11/9/22</a:t>
+              <a:t>11/10/22</a:t>
             </a:fld>
             <a:endParaRPr lang="en-US"/>
           </a:p>
@@ -3193,7 +3194,7 @@
           <a:p>
             <a:fld id="{DC921DF3-1FB0-45DC-97EF-461960E13574}" type="datetime1">
               <a:rPr lang="en-US" smtClean="0"/>
-              <a:t>11/9/22</a:t>
+              <a:t>11/10/22</a:t>
             </a:fld>
             <a:endParaRPr lang="en-US"/>
           </a:p>
@@ -3685,7 +3686,7 @@
           <a:p>
             <a:fld id="{092B088E-2809-46D8-B43F-738015D878CC}" type="datetime1">
               <a:rPr lang="en-US" smtClean="0"/>
-              <a:t>11/9/22</a:t>
+              <a:t>11/10/22</a:t>
             </a:fld>
             <a:endParaRPr lang="en-US"/>
           </a:p>
@@ -3880,7 +3881,7 @@
           <a:p>
             <a:fld id="{8208D42A-BC08-426E-9E11-483BA9D61AF6}" type="datetime1">
               <a:rPr lang="en-US" smtClean="0"/>
-              <a:t>11/9/22</a:t>
+              <a:t>11/10/22</a:t>
             </a:fld>
             <a:endParaRPr lang="en-US"/>
           </a:p>
@@ -4080,7 +4081,7 @@
           <a:p>
             <a:fld id="{26B28102-2E91-4DD7-8E8B-98B790A12701}" type="datetime1">
               <a:rPr lang="en-US" smtClean="0"/>
-              <a:t>11/9/22</a:t>
+              <a:t>11/10/22</a:t>
             </a:fld>
             <a:endParaRPr lang="en-US"/>
           </a:p>
@@ -4176,7 +4177,7 @@
           <a:p>
             <a:fld id="{37D5C786-44E1-4BD5-AD14-75F3EA166B5A}" type="datetime1">
               <a:rPr lang="en-US" smtClean="0"/>
-              <a:t>11/9/22</a:t>
+              <a:t>11/10/22</a:t>
             </a:fld>
             <a:endParaRPr lang="en-US"/>
           </a:p>
@@ -4387,7 +4388,7 @@
           <a:p>
             <a:fld id="{26B28102-2E91-4DD7-8E8B-98B790A12701}" type="datetime1">
               <a:rPr lang="en-US" smtClean="0"/>
-              <a:t>11/9/22</a:t>
+              <a:t>11/10/22</a:t>
             </a:fld>
             <a:endParaRPr lang="en-US"/>
           </a:p>
@@ -4940,8 +4941,8 @@
           <a:chExt cx="0" cy="0"/>
         </a:xfrm>
       </p:grpSpPr>
-      <mc:AlternateContent xmlns:mc="http://schemas.openxmlformats.org/markup-compatibility/2006" xmlns:a14="http://schemas.microsoft.com/office/drawing/2010/main">
-        <mc:Choice Requires="a14">
+      <mc:AlternateContent xmlns:mc="http://schemas.openxmlformats.org/markup-compatibility/2006">
+        <mc:Choice xmlns:a14="http://schemas.microsoft.com/office/drawing/2010/main" Requires="a14">
           <p:sp>
             <p:nvSpPr>
               <p:cNvPr id="2" name="Title 1"/>
@@ -4963,7 +4964,7 @@
                   <m:oMath xmlns:m="http://schemas.openxmlformats.org/officeDocument/2006/math">
                     <m:r>
                       <a:rPr lang="en-US" b="0" i="1" smtClean="0">
-                        <a:latin typeface="Cambria Math"/>
+                        <a:latin typeface="Cambria Math" panose="02040503050406030204" pitchFamily="18" charset="0"/>
                       </a:rPr>
                       <m:t>3</m:t>
                     </m:r>
@@ -4977,7 +4978,7 @@
             </p:txBody>
           </p:sp>
         </mc:Choice>
-        <mc:Fallback xmlns="">
+        <mc:Fallback>
           <p:sp>
             <p:nvSpPr>
               <p:cNvPr id="2" name="Title 1"/>
@@ -4989,10 +4990,10 @@
               </p:nvPr>
             </p:nvSpPr>
             <p:spPr>
-              <a:blipFill rotWithShape="1">
+              <a:blipFill>
                 <a:blip r:embed="rId2"/>
                 <a:stretch>
-                  <a:fillRect b="-8511"/>
+                  <a:fillRect t="-10606" b="-30303"/>
                 </a:stretch>
               </a:blipFill>
             </p:spPr>
@@ -5042,16 +5043,17 @@
         </p:nvGrpSpPr>
         <p:grpSpPr>
           <a:xfrm>
-            <a:off x="2181226" y="1481300"/>
-            <a:ext cx="5514975" cy="4914248"/>
-            <a:chOff x="657225" y="1481300"/>
-            <a:chExt cx="5514975" cy="4914248"/>
+            <a:off x="3349488" y="1481300"/>
+            <a:ext cx="4346713" cy="4914248"/>
+            <a:chOff x="1825487" y="1481300"/>
+            <a:chExt cx="4346713" cy="4914248"/>
           </a:xfrm>
         </p:grpSpPr>
         <p:cxnSp>
           <p:nvCxnSpPr>
             <p:cNvPr id="14" name="Straight Connector 13"/>
             <p:cNvCxnSpPr>
+              <a:cxnSpLocks/>
               <a:stCxn id="8" idx="1"/>
               <a:endCxn id="23" idx="2"/>
             </p:cNvCxnSpPr>
@@ -5090,6 +5092,7 @@
           <p:nvCxnSpPr>
             <p:cNvPr id="15" name="Straight Connector 14"/>
             <p:cNvCxnSpPr>
+              <a:cxnSpLocks/>
               <a:stCxn id="10" idx="2"/>
               <a:endCxn id="8" idx="3"/>
             </p:cNvCxnSpPr>
@@ -5128,6 +5131,7 @@
           <p:nvCxnSpPr>
             <p:cNvPr id="18" name="Straight Connector 17"/>
             <p:cNvCxnSpPr>
+              <a:cxnSpLocks/>
               <a:stCxn id="23" idx="1"/>
               <a:endCxn id="10" idx="3"/>
             </p:cNvCxnSpPr>
@@ -5164,196 +5168,9 @@
         </p:cxnSp>
         <p:cxnSp>
           <p:nvCxnSpPr>
-            <p:cNvPr id="21" name="Straight Connector 20"/>
-            <p:cNvCxnSpPr>
-              <a:stCxn id="28" idx="2"/>
-              <a:endCxn id="10" idx="0"/>
-            </p:cNvCxnSpPr>
-            <p:nvPr/>
-          </p:nvCxnSpPr>
-          <p:spPr>
-            <a:xfrm>
-              <a:off x="885825" y="3032235"/>
-              <a:ext cx="1168262" cy="1692165"/>
-            </a:xfrm>
-            <a:prstGeom prst="line">
-              <a:avLst/>
-            </a:prstGeom>
-            <a:solidFill>
-              <a:schemeClr val="tx2">
-                <a:lumMod val="60000"/>
-                <a:lumOff val="40000"/>
-                <a:alpha val="60000"/>
-              </a:schemeClr>
-            </a:solidFill>
-            <a:ln w="76200">
-              <a:solidFill>
-                <a:schemeClr val="tx1">
-                  <a:alpha val="28000"/>
-                </a:schemeClr>
-              </a:solidFill>
-            </a:ln>
-          </p:spPr>
-          <p:style>
-            <a:lnRef idx="1">
-              <a:schemeClr val="accent1"/>
-            </a:lnRef>
-            <a:fillRef idx="0">
-              <a:schemeClr val="accent1"/>
-            </a:fillRef>
-            <a:effectRef idx="0">
-              <a:schemeClr val="accent1"/>
-            </a:effectRef>
-            <a:fontRef idx="minor">
-              <a:schemeClr val="tx1"/>
-            </a:fontRef>
-          </p:style>
-        </p:cxnSp>
-        <p:cxnSp>
-          <p:nvCxnSpPr>
-            <p:cNvPr id="37" name="Straight Connector 36"/>
-            <p:cNvCxnSpPr>
-              <a:stCxn id="28" idx="3"/>
-              <a:endCxn id="29" idx="1"/>
-            </p:cNvCxnSpPr>
-            <p:nvPr/>
-          </p:nvCxnSpPr>
-          <p:spPr>
-            <a:xfrm flipV="1">
-              <a:off x="1114425" y="2447104"/>
-              <a:ext cx="1734926" cy="356531"/>
-            </a:xfrm>
-            <a:prstGeom prst="line">
-              <a:avLst/>
-            </a:prstGeom>
-            <a:solidFill>
-              <a:schemeClr val="tx2">
-                <a:lumMod val="60000"/>
-                <a:lumOff val="40000"/>
-                <a:alpha val="60000"/>
-              </a:schemeClr>
-            </a:solidFill>
-            <a:ln w="76200">
-              <a:solidFill>
-                <a:schemeClr val="tx1">
-                  <a:alpha val="28000"/>
-                </a:schemeClr>
-              </a:solidFill>
-            </a:ln>
-          </p:spPr>
-          <p:style>
-            <a:lnRef idx="1">
-              <a:schemeClr val="accent1"/>
-            </a:lnRef>
-            <a:fillRef idx="0">
-              <a:schemeClr val="accent1"/>
-            </a:fillRef>
-            <a:effectRef idx="0">
-              <a:schemeClr val="accent1"/>
-            </a:effectRef>
-            <a:fontRef idx="minor">
-              <a:schemeClr val="tx1"/>
-            </a:fontRef>
-          </p:style>
-        </p:cxnSp>
-        <p:cxnSp>
-          <p:nvCxnSpPr>
-            <p:cNvPr id="40" name="Straight Connector 39"/>
-            <p:cNvCxnSpPr>
-              <a:stCxn id="29" idx="3"/>
-              <a:endCxn id="26" idx="1"/>
-            </p:cNvCxnSpPr>
-            <p:nvPr/>
-          </p:nvCxnSpPr>
-          <p:spPr>
-            <a:xfrm>
-              <a:off x="3306551" y="2447104"/>
-              <a:ext cx="2408449" cy="586773"/>
-            </a:xfrm>
-            <a:prstGeom prst="line">
-              <a:avLst/>
-            </a:prstGeom>
-            <a:solidFill>
-              <a:schemeClr val="tx2">
-                <a:lumMod val="60000"/>
-                <a:lumOff val="40000"/>
-                <a:alpha val="60000"/>
-              </a:schemeClr>
-            </a:solidFill>
-            <a:ln w="76200">
-              <a:solidFill>
-                <a:schemeClr val="tx1">
-                  <a:alpha val="28000"/>
-                </a:schemeClr>
-              </a:solidFill>
-            </a:ln>
-          </p:spPr>
-          <p:style>
-            <a:lnRef idx="1">
-              <a:schemeClr val="accent1"/>
-            </a:lnRef>
-            <a:fillRef idx="0">
-              <a:schemeClr val="accent1"/>
-            </a:fillRef>
-            <a:effectRef idx="0">
-              <a:schemeClr val="accent1"/>
-            </a:effectRef>
-            <a:fontRef idx="minor">
-              <a:schemeClr val="tx1"/>
-            </a:fontRef>
-          </p:style>
-        </p:cxnSp>
-        <p:cxnSp>
-          <p:nvCxnSpPr>
-            <p:cNvPr id="43" name="Straight Connector 42"/>
-            <p:cNvCxnSpPr>
-              <a:stCxn id="29" idx="2"/>
-              <a:endCxn id="27" idx="0"/>
-            </p:cNvCxnSpPr>
-            <p:nvPr/>
-          </p:nvCxnSpPr>
-          <p:spPr>
-            <a:xfrm flipH="1">
-              <a:off x="2613080" y="2675704"/>
-              <a:ext cx="464871" cy="786795"/>
-            </a:xfrm>
-            <a:prstGeom prst="line">
-              <a:avLst/>
-            </a:prstGeom>
-            <a:solidFill>
-              <a:schemeClr val="tx2">
-                <a:lumMod val="60000"/>
-                <a:lumOff val="40000"/>
-                <a:alpha val="60000"/>
-              </a:schemeClr>
-            </a:solidFill>
-            <a:ln w="76200">
-              <a:solidFill>
-                <a:schemeClr val="tx1">
-                  <a:alpha val="28000"/>
-                </a:schemeClr>
-              </a:solidFill>
-            </a:ln>
-          </p:spPr>
-          <p:style>
-            <a:lnRef idx="1">
-              <a:schemeClr val="accent1"/>
-            </a:lnRef>
-            <a:fillRef idx="0">
-              <a:schemeClr val="accent1"/>
-            </a:fillRef>
-            <a:effectRef idx="0">
-              <a:schemeClr val="accent1"/>
-            </a:effectRef>
-            <a:fontRef idx="minor">
-              <a:schemeClr val="tx1"/>
-            </a:fontRef>
-          </p:style>
-        </p:cxnSp>
-        <p:cxnSp>
-          <p:nvCxnSpPr>
             <p:cNvPr id="46" name="Straight Connector 45"/>
             <p:cNvCxnSpPr>
+              <a:cxnSpLocks/>
               <a:stCxn id="27" idx="3"/>
               <a:endCxn id="30" idx="1"/>
             </p:cNvCxnSpPr>
@@ -5392,6 +5209,7 @@
           <p:nvCxnSpPr>
             <p:cNvPr id="49" name="Straight Connector 48"/>
             <p:cNvCxnSpPr>
+              <a:cxnSpLocks/>
               <a:stCxn id="26" idx="2"/>
               <a:endCxn id="30" idx="0"/>
             </p:cNvCxnSpPr>
@@ -5430,7 +5248,7 @@
           <p:nvCxnSpPr>
             <p:cNvPr id="73" name="Straight Connector 72"/>
             <p:cNvCxnSpPr>
-              <a:stCxn id="29" idx="3"/>
+              <a:cxnSpLocks/>
               <a:endCxn id="63" idx="1"/>
             </p:cNvCxnSpPr>
             <p:nvPr/>
@@ -5477,6 +5295,7 @@
           <p:nvCxnSpPr>
             <p:cNvPr id="76" name="Straight Connector 75"/>
             <p:cNvCxnSpPr>
+              <a:cxnSpLocks/>
               <a:stCxn id="26" idx="0"/>
               <a:endCxn id="63" idx="3"/>
             </p:cNvCxnSpPr>
@@ -5524,6 +5343,7 @@
           <p:nvCxnSpPr>
             <p:cNvPr id="81" name="Straight Connector 80"/>
             <p:cNvCxnSpPr>
+              <a:cxnSpLocks/>
               <a:stCxn id="23" idx="0"/>
               <a:endCxn id="30" idx="2"/>
             </p:cNvCxnSpPr>
@@ -5562,6 +5382,7 @@
           <p:nvCxnSpPr>
             <p:cNvPr id="84" name="Straight Connector 83"/>
             <p:cNvCxnSpPr>
+              <a:cxnSpLocks/>
               <a:stCxn id="23" idx="0"/>
               <a:endCxn id="26" idx="2"/>
             </p:cNvCxnSpPr>
@@ -5943,113 +5764,6 @@
         </p:sp>
         <p:sp>
           <p:nvSpPr>
-            <p:cNvPr id="28" name="Rectangle 27"/>
-            <p:cNvSpPr/>
-            <p:nvPr/>
-          </p:nvSpPr>
-          <p:spPr>
-            <a:xfrm>
-              <a:off x="657225" y="2575035"/>
-              <a:ext cx="457200" cy="457200"/>
-            </a:xfrm>
-            <a:prstGeom prst="rect">
-              <a:avLst/>
-            </a:prstGeom>
-            <a:solidFill>
-              <a:schemeClr val="tx2">
-                <a:lumMod val="60000"/>
-                <a:lumOff val="40000"/>
-                <a:alpha val="60000"/>
-              </a:schemeClr>
-            </a:solidFill>
-            <a:ln>
-              <a:solidFill>
-                <a:schemeClr val="tx1">
-                  <a:alpha val="28000"/>
-                </a:schemeClr>
-              </a:solidFill>
-            </a:ln>
-          </p:spPr>
-          <p:style>
-            <a:lnRef idx="2">
-              <a:schemeClr val="accent1">
-                <a:shade val="50000"/>
-              </a:schemeClr>
-            </a:lnRef>
-            <a:fillRef idx="1">
-              <a:schemeClr val="accent1"/>
-            </a:fillRef>
-            <a:effectRef idx="0">
-              <a:schemeClr val="accent1"/>
-            </a:effectRef>
-            <a:fontRef idx="minor">
-              <a:schemeClr val="lt1"/>
-            </a:fontRef>
-          </p:style>
-          <p:txBody>
-            <a:bodyPr rtlCol="0" anchor="ctr"/>
-            <a:lstStyle/>
-            <a:p>
-              <a:pPr algn="ctr"/>
-              <a:endParaRPr lang="en-US"/>
-            </a:p>
-          </p:txBody>
-        </p:sp>
-        <p:sp>
-          <p:nvSpPr>
-            <p:cNvPr id="29" name="Rectangle 28"/>
-            <p:cNvSpPr/>
-            <p:nvPr/>
-          </p:nvSpPr>
-          <p:spPr>
-            <a:xfrm>
-              <a:off x="2849351" y="2218504"/>
-              <a:ext cx="457200" cy="457200"/>
-            </a:xfrm>
-            <a:prstGeom prst="rect">
-              <a:avLst/>
-            </a:prstGeom>
-            <a:solidFill>
-              <a:srgbClr val="FF0000">
-                <a:alpha val="60000"/>
-              </a:srgbClr>
-            </a:solidFill>
-            <a:ln>
-              <a:solidFill>
-                <a:schemeClr val="tx2">
-                  <a:lumMod val="60000"/>
-                  <a:lumOff val="40000"/>
-                </a:schemeClr>
-              </a:solidFill>
-            </a:ln>
-          </p:spPr>
-          <p:style>
-            <a:lnRef idx="2">
-              <a:schemeClr val="accent1">
-                <a:shade val="50000"/>
-              </a:schemeClr>
-            </a:lnRef>
-            <a:fillRef idx="1">
-              <a:schemeClr val="accent1"/>
-            </a:fillRef>
-            <a:effectRef idx="0">
-              <a:schemeClr val="accent1"/>
-            </a:effectRef>
-            <a:fontRef idx="minor">
-              <a:schemeClr val="lt1"/>
-            </a:fontRef>
-          </p:style>
-          <p:txBody>
-            <a:bodyPr rtlCol="0" anchor="ctr"/>
-            <a:lstStyle/>
-            <a:p>
-              <a:pPr algn="ctr"/>
-              <a:endParaRPr lang="en-US"/>
-            </a:p>
-          </p:txBody>
-        </p:sp>
-        <p:sp>
-          <p:nvSpPr>
             <p:cNvPr id="30" name="Rectangle 29"/>
             <p:cNvSpPr/>
             <p:nvPr/>
@@ -6157,8 +5871,8 @@
           </p:txBody>
         </p:sp>
       </p:grpSp>
-      <mc:AlternateContent xmlns:mc="http://schemas.openxmlformats.org/markup-compatibility/2006" xmlns:a14="http://schemas.microsoft.com/office/drawing/2010/main">
-        <mc:Choice Requires="a14">
+      <mc:AlternateContent xmlns:mc="http://schemas.openxmlformats.org/markup-compatibility/2006">
+        <mc:Choice xmlns:a14="http://schemas.microsoft.com/office/drawing/2010/main" Requires="a14">
           <p:sp>
             <p:nvSpPr>
               <p:cNvPr id="90" name="TextBox 89"/>
@@ -6167,7 +5881,7 @@
             </p:nvSpPr>
             <p:spPr>
               <a:xfrm>
-                <a:off x="6629400" y="1158135"/>
+                <a:off x="7543800" y="1348773"/>
                 <a:ext cx="4038600" cy="830997"/>
               </a:xfrm>
               <a:prstGeom prst="rect">
@@ -6188,8 +5902,8 @@
                 <a14:m>
                   <m:oMath xmlns:m="http://schemas.openxmlformats.org/officeDocument/2006/math">
                     <m:r>
-                      <a:rPr lang="en-US" sz="2400" i="1">
-                        <a:latin typeface="Cambria Math"/>
+                      <a:rPr lang="en-US" sz="2400" b="0" i="1" smtClean="0">
+                        <a:latin typeface="Cambria Math" panose="02040503050406030204" pitchFamily="18" charset="0"/>
                       </a:rPr>
                       <m:t>3</m:t>
                     </m:r>
@@ -6203,7 +5917,7 @@
             </p:txBody>
           </p:sp>
         </mc:Choice>
-        <mc:Fallback xmlns="">
+        <mc:Fallback>
           <p:sp>
             <p:nvSpPr>
               <p:cNvPr id="90" name="TextBox 89"/>
@@ -6214,7 +5928,7 @@
             </p:nvSpPr>
             <p:spPr>
               <a:xfrm>
-                <a:off x="6629400" y="1158135"/>
+                <a:off x="7543800" y="1348773"/>
                 <a:ext cx="4038600" cy="830997"/>
               </a:xfrm>
               <a:prstGeom prst="rect">
@@ -6250,8 +5964,8 @@
         </p:nvSpPr>
         <p:spPr>
           <a:xfrm>
-            <a:off x="8648700" y="1987672"/>
-            <a:ext cx="1066800" cy="461665"/>
+            <a:off x="8238066" y="2641506"/>
+            <a:ext cx="3572934" cy="3785652"/>
           </a:xfrm>
           <a:prstGeom prst="rect">
             <a:avLst/>
@@ -6266,20 +5980,45 @@
           <a:p>
             <a:r>
               <a:rPr lang="en-US" sz="2400" dirty="0"/>
-              <a:t>No!</a:t>
+              <a:t>Yes!</a:t>
+            </a:r>
+          </a:p>
+          <a:p>
+            <a:endParaRPr lang="en-US" sz="2400" dirty="0"/>
+          </a:p>
+          <a:p>
+            <a:r>
+              <a:rPr lang="en-US" sz="2400" i="1" dirty="0"/>
+              <a:t>This node IS in the vertex cover!</a:t>
+            </a:r>
+          </a:p>
+          <a:p>
+            <a:endParaRPr lang="en-US" sz="2400" i="1" dirty="0"/>
+          </a:p>
+          <a:p>
+            <a:r>
+              <a:rPr lang="en-US" sz="2400" i="1" dirty="0"/>
+              <a:t>Wait, what!? </a:t>
+            </a:r>
+            <a:br>
+              <a:rPr lang="en-US" sz="2400" i="1" dirty="0"/>
+            </a:br>
+            <a:r>
+              <a:rPr lang="en-US" sz="2400" i="1" dirty="0"/>
+              <a:t>Actually, this blue node is in SOME vertex cover of size 4 so algorithm still works.</a:t>
             </a:r>
           </a:p>
         </p:txBody>
       </p:sp>
       <p:sp>
         <p:nvSpPr>
-          <p:cNvPr id="3" name="&quot;No&quot; Symbol 2"/>
+          <p:cNvPr id="33" name="&quot;No&quot; Symbol 32"/>
           <p:cNvSpPr/>
           <p:nvPr/>
         </p:nvSpPr>
         <p:spPr>
           <a:xfrm>
-            <a:off x="2055848" y="2451300"/>
+            <a:off x="5638801" y="1349446"/>
             <a:ext cx="707955" cy="707955"/>
           </a:xfrm>
           <a:prstGeom prst="noSmoking">
@@ -6327,29 +6066,80 @@
           </a:p>
         </p:txBody>
       </p:sp>
+      <p:cxnSp>
+        <p:nvCxnSpPr>
+          <p:cNvPr id="34" name="Straight Connector 33">
+            <a:extLst>
+              <a:ext uri="{FF2B5EF4-FFF2-40B4-BE49-F238E27FC236}">
+                <a16:creationId xmlns:a16="http://schemas.microsoft.com/office/drawing/2014/main" id="{6076086A-E8D6-A448-B3DB-31A6F2EC7580}"/>
+              </a:ext>
+            </a:extLst>
+          </p:cNvPr>
+          <p:cNvCxnSpPr>
+            <a:stCxn id="39" idx="2"/>
+          </p:cNvCxnSpPr>
+          <p:nvPr/>
+        </p:nvCxnSpPr>
+        <p:spPr>
+          <a:xfrm>
+            <a:off x="2409826" y="3032235"/>
+            <a:ext cx="1168262" cy="1692165"/>
+          </a:xfrm>
+          <a:prstGeom prst="line">
+            <a:avLst/>
+          </a:prstGeom>
+          <a:ln w="76200">
+            <a:solidFill>
+              <a:schemeClr val="tx1"/>
+            </a:solidFill>
+          </a:ln>
+        </p:spPr>
+        <p:style>
+          <a:lnRef idx="1">
+            <a:schemeClr val="accent1"/>
+          </a:lnRef>
+          <a:fillRef idx="0">
+            <a:schemeClr val="accent1"/>
+          </a:fillRef>
+          <a:effectRef idx="0">
+            <a:schemeClr val="accent1"/>
+          </a:effectRef>
+          <a:fontRef idx="minor">
+            <a:schemeClr val="tx1"/>
+          </a:fontRef>
+        </p:style>
+      </p:cxnSp>
       <p:sp>
         <p:nvSpPr>
-          <p:cNvPr id="32" name="&quot;No&quot; Symbol 31"/>
+          <p:cNvPr id="39" name="Rectangle 38">
+            <a:extLst>
+              <a:ext uri="{FF2B5EF4-FFF2-40B4-BE49-F238E27FC236}">
+                <a16:creationId xmlns:a16="http://schemas.microsoft.com/office/drawing/2014/main" id="{6D62542A-36C2-9848-ABA1-148A7B7EEC8E}"/>
+              </a:ext>
+            </a:extLst>
+          </p:cNvPr>
           <p:cNvSpPr/>
           <p:nvPr/>
         </p:nvSpPr>
         <p:spPr>
           <a:xfrm>
-            <a:off x="4247974" y="2100419"/>
-            <a:ext cx="707955" cy="707955"/>
+            <a:off x="2181226" y="2575035"/>
+            <a:ext cx="457200" cy="457200"/>
           </a:xfrm>
-          <a:prstGeom prst="noSmoking">
-            <a:avLst>
-              <a:gd name="adj" fmla="val 9278"/>
-            </a:avLst>
+          <a:prstGeom prst="rect">
+            <a:avLst/>
           </a:prstGeom>
           <a:solidFill>
-            <a:srgbClr val="FFFF00"/>
+            <a:schemeClr val="tx2">
+              <a:lumMod val="60000"/>
+              <a:lumOff val="40000"/>
+            </a:schemeClr>
           </a:solidFill>
           <a:ln>
             <a:solidFill>
-              <a:schemeClr val="accent6">
-                <a:lumMod val="75000"/>
+              <a:schemeClr val="tx2">
+                <a:lumMod val="60000"/>
+                <a:lumOff val="40000"/>
               </a:schemeClr>
             </a:solidFill>
           </a:ln>
@@ -6375,23 +6165,240 @@
           <a:lstStyle/>
           <a:p>
             <a:pPr algn="ctr"/>
-            <a:endParaRPr lang="en-US">
-              <a:solidFill>
-                <a:schemeClr val="tx1"/>
-              </a:solidFill>
-            </a:endParaRPr>
+            <a:endParaRPr lang="en-US" dirty="0"/>
           </a:p>
         </p:txBody>
       </p:sp>
+      <p:cxnSp>
+        <p:nvCxnSpPr>
+          <p:cNvPr id="44" name="Straight Connector 43">
+            <a:extLst>
+              <a:ext uri="{FF2B5EF4-FFF2-40B4-BE49-F238E27FC236}">
+                <a16:creationId xmlns:a16="http://schemas.microsoft.com/office/drawing/2014/main" id="{21FF04B3-F975-EB43-8A13-73C4476B02EA}"/>
+              </a:ext>
+            </a:extLst>
+          </p:cNvPr>
+          <p:cNvCxnSpPr>
+            <a:stCxn id="47" idx="3"/>
+          </p:cNvCxnSpPr>
+          <p:nvPr/>
+        </p:nvCxnSpPr>
+        <p:spPr>
+          <a:xfrm>
+            <a:off x="4830552" y="2447104"/>
+            <a:ext cx="2408449" cy="586773"/>
+          </a:xfrm>
+          <a:prstGeom prst="line">
+            <a:avLst/>
+          </a:prstGeom>
+          <a:solidFill>
+            <a:schemeClr val="tx2">
+              <a:lumMod val="60000"/>
+              <a:lumOff val="40000"/>
+              <a:alpha val="60000"/>
+            </a:schemeClr>
+          </a:solidFill>
+          <a:ln w="76200">
+            <a:solidFill>
+              <a:schemeClr val="tx1">
+                <a:alpha val="28000"/>
+              </a:schemeClr>
+            </a:solidFill>
+          </a:ln>
+        </p:spPr>
+        <p:style>
+          <a:lnRef idx="1">
+            <a:schemeClr val="accent1"/>
+          </a:lnRef>
+          <a:fillRef idx="0">
+            <a:schemeClr val="accent1"/>
+          </a:fillRef>
+          <a:effectRef idx="0">
+            <a:schemeClr val="accent1"/>
+          </a:effectRef>
+          <a:fontRef idx="minor">
+            <a:schemeClr val="tx1"/>
+          </a:fontRef>
+        </p:style>
+      </p:cxnSp>
+      <p:cxnSp>
+        <p:nvCxnSpPr>
+          <p:cNvPr id="45" name="Straight Connector 44">
+            <a:extLst>
+              <a:ext uri="{FF2B5EF4-FFF2-40B4-BE49-F238E27FC236}">
+                <a16:creationId xmlns:a16="http://schemas.microsoft.com/office/drawing/2014/main" id="{E42C82F3-C509-A542-AB6C-4E7DF14EEAFD}"/>
+              </a:ext>
+            </a:extLst>
+          </p:cNvPr>
+          <p:cNvCxnSpPr>
+            <a:stCxn id="47" idx="2"/>
+          </p:cNvCxnSpPr>
+          <p:nvPr/>
+        </p:nvCxnSpPr>
+        <p:spPr>
+          <a:xfrm flipH="1">
+            <a:off x="4137081" y="2675704"/>
+            <a:ext cx="464871" cy="786795"/>
+          </a:xfrm>
+          <a:prstGeom prst="line">
+            <a:avLst/>
+          </a:prstGeom>
+          <a:solidFill>
+            <a:schemeClr val="tx2">
+              <a:lumMod val="60000"/>
+              <a:lumOff val="40000"/>
+              <a:alpha val="60000"/>
+            </a:schemeClr>
+          </a:solidFill>
+          <a:ln w="76200">
+            <a:solidFill>
+              <a:schemeClr val="tx1">
+                <a:alpha val="28000"/>
+              </a:schemeClr>
+            </a:solidFill>
+          </a:ln>
+        </p:spPr>
+        <p:style>
+          <a:lnRef idx="1">
+            <a:schemeClr val="accent1"/>
+          </a:lnRef>
+          <a:fillRef idx="0">
+            <a:schemeClr val="accent1"/>
+          </a:fillRef>
+          <a:effectRef idx="0">
+            <a:schemeClr val="accent1"/>
+          </a:effectRef>
+          <a:fontRef idx="minor">
+            <a:schemeClr val="tx1"/>
+          </a:fontRef>
+        </p:style>
+      </p:cxnSp>
       <p:sp>
         <p:nvSpPr>
-          <p:cNvPr id="33" name="&quot;No&quot; Symbol 32"/>
+          <p:cNvPr id="47" name="Rectangle 46">
+            <a:extLst>
+              <a:ext uri="{FF2B5EF4-FFF2-40B4-BE49-F238E27FC236}">
+                <a16:creationId xmlns:a16="http://schemas.microsoft.com/office/drawing/2014/main" id="{82052DEB-D612-3A4B-90BE-1DEEACD1F320}"/>
+              </a:ext>
+            </a:extLst>
+          </p:cNvPr>
           <p:cNvSpPr/>
           <p:nvPr/>
         </p:nvSpPr>
         <p:spPr>
           <a:xfrm>
-            <a:off x="5638801" y="1349446"/>
+            <a:off x="4373352" y="2218504"/>
+            <a:ext cx="457200" cy="457200"/>
+          </a:xfrm>
+          <a:prstGeom prst="rect">
+            <a:avLst/>
+          </a:prstGeom>
+          <a:solidFill>
+            <a:srgbClr val="FF0000">
+              <a:alpha val="60000"/>
+            </a:srgbClr>
+          </a:solidFill>
+          <a:ln>
+            <a:solidFill>
+              <a:schemeClr val="tx1">
+                <a:alpha val="28000"/>
+              </a:schemeClr>
+            </a:solidFill>
+          </a:ln>
+        </p:spPr>
+        <p:style>
+          <a:lnRef idx="2">
+            <a:schemeClr val="accent1">
+              <a:shade val="50000"/>
+            </a:schemeClr>
+          </a:lnRef>
+          <a:fillRef idx="1">
+            <a:schemeClr val="accent1"/>
+          </a:fillRef>
+          <a:effectRef idx="0">
+            <a:schemeClr val="accent1"/>
+          </a:effectRef>
+          <a:fontRef idx="minor">
+            <a:schemeClr val="lt1"/>
+          </a:fontRef>
+        </p:style>
+        <p:txBody>
+          <a:bodyPr rtlCol="0" anchor="ctr"/>
+          <a:lstStyle/>
+          <a:p>
+            <a:pPr algn="ctr"/>
+            <a:r>
+              <a:rPr lang="en-US" dirty="0"/>
+              <a:t>     </a:t>
+            </a:r>
+          </a:p>
+        </p:txBody>
+      </p:sp>
+      <p:cxnSp>
+        <p:nvCxnSpPr>
+          <p:cNvPr id="48" name="Straight Connector 47">
+            <a:extLst>
+              <a:ext uri="{FF2B5EF4-FFF2-40B4-BE49-F238E27FC236}">
+                <a16:creationId xmlns:a16="http://schemas.microsoft.com/office/drawing/2014/main" id="{5B913DE9-569F-9846-8BD1-30B9A7F7968C}"/>
+              </a:ext>
+            </a:extLst>
+          </p:cNvPr>
+          <p:cNvCxnSpPr/>
+          <p:nvPr/>
+        </p:nvCxnSpPr>
+        <p:spPr>
+          <a:xfrm flipV="1">
+            <a:off x="2638426" y="2447104"/>
+            <a:ext cx="1734926" cy="356531"/>
+          </a:xfrm>
+          <a:prstGeom prst="line">
+            <a:avLst/>
+          </a:prstGeom>
+          <a:solidFill>
+            <a:schemeClr val="tx2">
+              <a:lumMod val="60000"/>
+              <a:lumOff val="40000"/>
+              <a:alpha val="60000"/>
+            </a:schemeClr>
+          </a:solidFill>
+          <a:ln w="76200">
+            <a:solidFill>
+              <a:schemeClr val="tx1">
+                <a:alpha val="23000"/>
+              </a:schemeClr>
+            </a:solidFill>
+          </a:ln>
+        </p:spPr>
+        <p:style>
+          <a:lnRef idx="1">
+            <a:schemeClr val="accent1"/>
+          </a:lnRef>
+          <a:fillRef idx="0">
+            <a:schemeClr val="accent1"/>
+          </a:fillRef>
+          <a:effectRef idx="0">
+            <a:schemeClr val="accent1"/>
+          </a:effectRef>
+          <a:fontRef idx="minor">
+            <a:schemeClr val="tx1"/>
+          </a:fontRef>
+        </p:style>
+      </p:cxnSp>
+      <p:sp>
+        <p:nvSpPr>
+          <p:cNvPr id="42" name="&quot;No&quot; Symbol 41">
+            <a:extLst>
+              <a:ext uri="{FF2B5EF4-FFF2-40B4-BE49-F238E27FC236}">
+                <a16:creationId xmlns:a16="http://schemas.microsoft.com/office/drawing/2014/main" id="{6135002A-1BC8-C941-A65D-AEFEE1EA4C0A}"/>
+              </a:ext>
+            </a:extLst>
+          </p:cNvPr>
+          <p:cNvSpPr/>
+          <p:nvPr/>
+        </p:nvSpPr>
+        <p:spPr>
+          <a:xfrm>
+            <a:off x="4247974" y="2100419"/>
             <a:ext cx="707955" cy="707955"/>
           </a:xfrm>
           <a:prstGeom prst="noSmoking">
@@ -6549,6 +6556,131 @@
       </p:grpSpPr>
       <p:sp>
         <p:nvSpPr>
+          <p:cNvPr id="2" name="Title 1"/>
+          <p:cNvSpPr>
+            <a:spLocks noGrp="1"/>
+          </p:cNvSpPr>
+          <p:nvPr>
+            <p:ph type="title"/>
+          </p:nvPr>
+        </p:nvSpPr>
+        <p:spPr/>
+        <p:txBody>
+          <a:bodyPr>
+            <a:normAutofit/>
+          </a:bodyPr>
+          <a:lstStyle/>
+          <a:p>
+            <a:r>
+              <a:rPr lang="en-US" dirty="0"/>
+              <a:t>Why does this work?</a:t>
+            </a:r>
+          </a:p>
+        </p:txBody>
+      </p:sp>
+      <p:sp>
+        <p:nvSpPr>
+          <p:cNvPr id="3" name="Content Placeholder 2"/>
+          <p:cNvSpPr>
+            <a:spLocks noGrp="1"/>
+          </p:cNvSpPr>
+          <p:nvPr>
+            <p:ph idx="1"/>
+          </p:nvPr>
+        </p:nvSpPr>
+        <p:spPr/>
+        <p:txBody>
+          <a:bodyPr/>
+          <a:lstStyle/>
+          <a:p>
+            <a:pPr marL="0" indent="0">
+              <a:buNone/>
+            </a:pPr>
+            <a:r>
+              <a:rPr lang="en-US" b="1" i="1" u="sng" dirty="0"/>
+              <a:t>If node ‘v’ IS in any VC</a:t>
+            </a:r>
+            <a:r>
+              <a:rPr lang="en-US" dirty="0"/>
+              <a:t>: Then ‘v’ covers its incident edges and k-1 nodes can be used to cover the rest (use decider to find out). Node can safely be removed because it has already been “counted”</a:t>
+            </a:r>
+          </a:p>
+          <a:p>
+            <a:pPr marL="0" indent="0">
+              <a:buNone/>
+            </a:pPr>
+            <a:endParaRPr lang="en-US" dirty="0"/>
+          </a:p>
+          <a:p>
+            <a:pPr marL="0" indent="0">
+              <a:buNone/>
+            </a:pPr>
+            <a:r>
+              <a:rPr lang="en-US" b="1" i="1" u="sng" dirty="0"/>
+              <a:t>If node ‘v’ NOT in any VC</a:t>
+            </a:r>
+            <a:r>
+              <a:rPr lang="en-US" dirty="0"/>
+              <a:t>: Then another node needs to cover it’s edges, but it won’t be usable with k = i-1 (not enough nodes)</a:t>
+            </a:r>
+          </a:p>
+        </p:txBody>
+      </p:sp>
+      <p:sp>
+        <p:nvSpPr>
+          <p:cNvPr id="4" name="Slide Number Placeholder 3"/>
+          <p:cNvSpPr>
+            <a:spLocks noGrp="1"/>
+          </p:cNvSpPr>
+          <p:nvPr>
+            <p:ph type="sldNum" sz="quarter" idx="12"/>
+          </p:nvPr>
+        </p:nvSpPr>
+        <p:spPr/>
+        <p:txBody>
+          <a:bodyPr/>
+          <a:lstStyle/>
+          <a:p>
+            <a:fld id="{86BADE50-950A-4D58-BFB2-FA2C6A8B385D}" type="slidenum">
+              <a:rPr lang="en-US" smtClean="0"/>
+              <a:t>11</a:t>
+            </a:fld>
+            <a:endParaRPr lang="en-US"/>
+          </a:p>
+        </p:txBody>
+      </p:sp>
+    </p:spTree>
+    <p:extLst>
+      <p:ext uri="{BB962C8B-B14F-4D97-AF65-F5344CB8AC3E}">
+        <p14:creationId xmlns:p14="http://schemas.microsoft.com/office/powerpoint/2010/main" val="2146393"/>
+      </p:ext>
+    </p:extLst>
+  </p:cSld>
+  <p:clrMapOvr>
+    <a:masterClrMapping/>
+  </p:clrMapOvr>
+</p:sld>
+</file>
+
+<file path=ppt/slides/slide12.xml><?xml version="1.0" encoding="utf-8"?>
+<p:sld xmlns:a="http://schemas.openxmlformats.org/drawingml/2006/main" xmlns:r="http://schemas.openxmlformats.org/officeDocument/2006/relationships" xmlns:p="http://schemas.openxmlformats.org/presentationml/2006/main">
+  <p:cSld>
+    <p:spTree>
+      <p:nvGrpSpPr>
+        <p:cNvPr id="1" name=""/>
+        <p:cNvGrpSpPr/>
+        <p:nvPr/>
+      </p:nvGrpSpPr>
+      <p:grpSpPr>
+        <a:xfrm>
+          <a:off x="0" y="0"/>
+          <a:ext cx="0" cy="0"/>
+          <a:chOff x="0" y="0"/>
+          <a:chExt cx="0" cy="0"/>
+        </a:xfrm>
+      </p:grpSpPr>
+      <p:sp>
+        <p:nvSpPr>
           <p:cNvPr id="34" name="Rectangle 33"/>
           <p:cNvSpPr/>
           <p:nvPr/>
@@ -6638,7 +6770,7 @@
           <a:p>
             <a:fld id="{86BADE50-950A-4D58-BFB2-FA2C6A8B385D}" type="slidenum">
               <a:rPr lang="en-US" smtClean="0"/>
-              <a:t>11</a:t>
+              <a:t>12</a:t>
             </a:fld>
             <a:endParaRPr lang="en-US"/>
           </a:p>
@@ -7919,7 +8051,7 @@
 </p:sld>
 </file>
 
-<file path=ppt/slides/slide12.xml><?xml version="1.0" encoding="utf-8"?>
+<file path=ppt/slides/slide13.xml><?xml version="1.0" encoding="utf-8"?>
 <p:sld xmlns:a="http://schemas.openxmlformats.org/drawingml/2006/main" xmlns:r="http://schemas.openxmlformats.org/officeDocument/2006/relationships" xmlns:p="http://schemas.openxmlformats.org/presentationml/2006/main">
   <p:cSld>
     <p:spTree>
@@ -7995,7 +8127,7 @@
             <a:fld id="{A8D2B1A1-9A82-492A-87A6-500459A044C8}" type="slidenum">
               <a:rPr lang="en-US" smtClean="0"/>
               <a:pPr/>
-              <a:t>12</a:t>
+              <a:t>13</a:t>
             </a:fld>
             <a:endParaRPr lang="en-US"/>
           </a:p>
@@ -8014,7 +8146,7 @@
 </p:sld>
 </file>
 
-<file path=ppt/slides/slide13.xml><?xml version="1.0" encoding="utf-8"?>
+<file path=ppt/slides/slide14.xml><?xml version="1.0" encoding="utf-8"?>
 <p:sld xmlns:a="http://schemas.openxmlformats.org/drawingml/2006/main" xmlns:r="http://schemas.openxmlformats.org/officeDocument/2006/relationships" xmlns:p="http://schemas.openxmlformats.org/presentationml/2006/main">
   <p:cSld>
     <p:spTree>
@@ -8397,7 +8529,7 @@
           <a:p>
             <a:fld id="{86BADE50-950A-4D58-BFB2-FA2C6A8B385D}" type="slidenum">
               <a:rPr lang="en-US" smtClean="0"/>
-              <a:t>13</a:t>
+              <a:t>14</a:t>
             </a:fld>
             <a:endParaRPr lang="en-US"/>
           </a:p>
@@ -8522,7 +8654,7 @@
 </p:sld>
 </file>
 
-<file path=ppt/slides/slide14.xml><?xml version="1.0" encoding="utf-8"?>
+<file path=ppt/slides/slide15.xml><?xml version="1.0" encoding="utf-8"?>
 <p:sld xmlns:a="http://schemas.openxmlformats.org/drawingml/2006/main" xmlns:r="http://schemas.openxmlformats.org/officeDocument/2006/relationships" xmlns:p="http://schemas.openxmlformats.org/presentationml/2006/main">
   <p:cSld>
     <p:spTree>
@@ -8539,8 +8671,8 @@
           <a:chExt cx="0" cy="0"/>
         </a:xfrm>
       </p:grpSpPr>
-      <mc:AlternateContent xmlns:mc="http://schemas.openxmlformats.org/markup-compatibility/2006">
-        <mc:Choice xmlns:a14="http://schemas.microsoft.com/office/drawing/2010/main" Requires="a14">
+      <mc:AlternateContent xmlns:mc="http://schemas.openxmlformats.org/markup-compatibility/2006" xmlns:a14="http://schemas.microsoft.com/office/drawing/2010/main">
+        <mc:Choice Requires="a14">
           <p:sp>
             <p:nvSpPr>
               <p:cNvPr id="2" name="Title 1"/>
@@ -8574,7 +8706,7 @@
             </p:txBody>
           </p:sp>
         </mc:Choice>
-        <mc:Fallback>
+        <mc:Fallback xmlns="">
           <p:sp>
             <p:nvSpPr>
               <p:cNvPr id="2" name="Title 1"/>
@@ -8819,14 +8951,14 @@
           <a:p>
             <a:fld id="{86BADE50-950A-4D58-BFB2-FA2C6A8B385D}" type="slidenum">
               <a:rPr lang="en-US" smtClean="0"/>
-              <a:t>14</a:t>
+              <a:t>15</a:t>
             </a:fld>
             <a:endParaRPr lang="en-US"/>
           </a:p>
         </p:txBody>
       </p:sp>
-      <mc:AlternateContent xmlns:mc="http://schemas.openxmlformats.org/markup-compatibility/2006">
-        <mc:Choice xmlns:a14="http://schemas.microsoft.com/office/drawing/2010/main" Requires="a14">
+      <mc:AlternateContent xmlns:mc="http://schemas.openxmlformats.org/markup-compatibility/2006" xmlns:a14="http://schemas.microsoft.com/office/drawing/2010/main">
+        <mc:Choice Requires="a14">
           <p:sp>
             <p:nvSpPr>
               <p:cNvPr id="30" name="Content Placeholder 2"/>
@@ -9142,7 +9274,7 @@
             </p:txBody>
           </p:sp>
         </mc:Choice>
-        <mc:Fallback>
+        <mc:Fallback xmlns="">
           <p:sp>
             <p:nvSpPr>
               <p:cNvPr id="30" name="Content Placeholder 2"/>
@@ -9181,8 +9313,8 @@
           </p:sp>
         </mc:Fallback>
       </mc:AlternateContent>
-      <mc:AlternateContent xmlns:mc="http://schemas.openxmlformats.org/markup-compatibility/2006">
-        <mc:Choice xmlns:a14="http://schemas.microsoft.com/office/drawing/2010/main" Requires="a14">
+      <mc:AlternateContent xmlns:mc="http://schemas.openxmlformats.org/markup-compatibility/2006" xmlns:a14="http://schemas.microsoft.com/office/drawing/2010/main">
+        <mc:Choice Requires="a14">
           <p:sp>
             <p:nvSpPr>
               <p:cNvPr id="6" name="Content Placeholder 2">
@@ -9391,7 +9523,7 @@
             </p:txBody>
           </p:sp>
         </mc:Choice>
-        <mc:Fallback>
+        <mc:Fallback xmlns="">
           <p:sp>
             <p:nvSpPr>
               <p:cNvPr id="6" name="Content Placeholder 2">
@@ -9589,7 +9721,7 @@
 </p:sld>
 </file>
 
-<file path=ppt/slides/slide15.xml><?xml version="1.0" encoding="utf-8"?>
+<file path=ppt/slides/slide16.xml><?xml version="1.0" encoding="utf-8"?>
 <p:sld xmlns:a="http://schemas.openxmlformats.org/drawingml/2006/main" xmlns:r="http://schemas.openxmlformats.org/officeDocument/2006/relationships" xmlns:p="http://schemas.openxmlformats.org/presentationml/2006/main">
   <p:cSld>
     <p:spTree>
@@ -9990,7 +10122,7 @@
           <a:p>
             <a:fld id="{86BADE50-950A-4D58-BFB2-FA2C6A8B385D}" type="slidenum">
               <a:rPr lang="en-US" smtClean="0"/>
-              <a:t>15</a:t>
+              <a:t>16</a:t>
             </a:fld>
             <a:endParaRPr lang="en-US"/>
           </a:p>
@@ -10269,7 +10401,7 @@
 </p:sld>
 </file>
 
-<file path=ppt/slides/slide16.xml><?xml version="1.0" encoding="utf-8"?>
+<file path=ppt/slides/slide17.xml><?xml version="1.0" encoding="utf-8"?>
 <p:sld xmlns:a="http://schemas.openxmlformats.org/drawingml/2006/main" xmlns:r="http://schemas.openxmlformats.org/officeDocument/2006/relationships" xmlns:p="http://schemas.openxmlformats.org/presentationml/2006/main">
   <p:cSld>
     <p:spTree>
@@ -10379,7 +10511,7 @@
           <a:p>
             <a:fld id="{86BADE50-950A-4D58-BFB2-FA2C6A8B385D}" type="slidenum">
               <a:rPr lang="en-US" smtClean="0"/>
-              <a:t>16</a:t>
+              <a:t>17</a:t>
             </a:fld>
             <a:endParaRPr lang="en-US"/>
           </a:p>
@@ -12070,7 +12202,7 @@
 </p:sld>
 </file>
 
-<file path=ppt/slides/slide17.xml><?xml version="1.0" encoding="utf-8"?>
+<file path=ppt/slides/slide18.xml><?xml version="1.0" encoding="utf-8"?>
 <p:sld xmlns:a="http://schemas.openxmlformats.org/drawingml/2006/main" xmlns:r="http://schemas.openxmlformats.org/officeDocument/2006/relationships" xmlns:p="http://schemas.openxmlformats.org/presentationml/2006/main">
   <p:cSld>
     <p:spTree>
@@ -12403,7 +12535,7 @@
           <a:p>
             <a:fld id="{86BADE50-950A-4D58-BFB2-FA2C6A8B385D}" type="slidenum">
               <a:rPr lang="en-US" smtClean="0"/>
-              <a:t>17</a:t>
+              <a:t>18</a:t>
             </a:fld>
             <a:endParaRPr lang="en-US"/>
           </a:p>
@@ -12808,7 +12940,7 @@
 </p:sld>
 </file>
 
-<file path=ppt/slides/slide18.xml><?xml version="1.0" encoding="utf-8"?>
+<file path=ppt/slides/slide19.xml><?xml version="1.0" encoding="utf-8"?>
 <p:sld xmlns:a="http://schemas.openxmlformats.org/drawingml/2006/main" xmlns:r="http://schemas.openxmlformats.org/officeDocument/2006/relationships" xmlns:p="http://schemas.openxmlformats.org/presentationml/2006/main">
   <p:cSld>
     <p:spTree>
@@ -12918,7 +13050,7 @@
           <a:p>
             <a:fld id="{86BADE50-950A-4D58-BFB2-FA2C6A8B385D}" type="slidenum">
               <a:rPr lang="en-US" smtClean="0"/>
-              <a:t>18</a:t>
+              <a:t>19</a:t>
             </a:fld>
             <a:endParaRPr lang="en-US"/>
           </a:p>
@@ -14600,7 +14732,181 @@
 </p:sld>
 </file>
 
-<file path=ppt/slides/slide19.xml><?xml version="1.0" encoding="utf-8"?>
+<file path=ppt/slides/slide2.xml><?xml version="1.0" encoding="utf-8"?>
+<p:sld xmlns:a="http://schemas.openxmlformats.org/drawingml/2006/main" xmlns:r="http://schemas.openxmlformats.org/officeDocument/2006/relationships" xmlns:p="http://schemas.openxmlformats.org/presentationml/2006/main">
+  <p:cSld>
+    <p:spTree>
+      <p:nvGrpSpPr>
+        <p:cNvPr id="1" name=""/>
+        <p:cNvGrpSpPr/>
+        <p:nvPr/>
+      </p:nvGrpSpPr>
+      <p:grpSpPr>
+        <a:xfrm>
+          <a:off x="0" y="0"/>
+          <a:ext cx="0" cy="0"/>
+          <a:chOff x="0" y="0"/>
+          <a:chExt cx="0" cy="0"/>
+        </a:xfrm>
+      </p:grpSpPr>
+      <p:sp>
+        <p:nvSpPr>
+          <p:cNvPr id="2" name="Title 1">
+            <a:extLst>
+              <a:ext uri="{FF2B5EF4-FFF2-40B4-BE49-F238E27FC236}">
+                <a16:creationId xmlns:a16="http://schemas.microsoft.com/office/drawing/2014/main" id="{7F398ADC-F6F6-C043-8CC0-36C31B64D1C1}"/>
+              </a:ext>
+            </a:extLst>
+          </p:cNvPr>
+          <p:cNvSpPr>
+            <a:spLocks noGrp="1"/>
+          </p:cNvSpPr>
+          <p:nvPr>
+            <p:ph type="title"/>
+          </p:nvPr>
+        </p:nvSpPr>
+        <p:spPr/>
+        <p:txBody>
+          <a:bodyPr/>
+          <a:lstStyle/>
+          <a:p>
+            <a:r>
+              <a:rPr lang="en-US" dirty="0"/>
+              <a:t>Some Preliminaries</a:t>
+            </a:r>
+          </a:p>
+        </p:txBody>
+      </p:sp>
+      <p:sp>
+        <p:nvSpPr>
+          <p:cNvPr id="3" name="Content Placeholder 2">
+            <a:extLst>
+              <a:ext uri="{FF2B5EF4-FFF2-40B4-BE49-F238E27FC236}">
+                <a16:creationId xmlns:a16="http://schemas.microsoft.com/office/drawing/2014/main" id="{A60538D5-BB5F-F043-9A7C-1C14D0119429}"/>
+              </a:ext>
+            </a:extLst>
+          </p:cNvPr>
+          <p:cNvSpPr>
+            <a:spLocks noGrp="1"/>
+          </p:cNvSpPr>
+          <p:nvPr>
+            <p:ph idx="1"/>
+          </p:nvPr>
+        </p:nvSpPr>
+        <p:spPr>
+          <a:xfrm>
+            <a:off x="609600" y="1600200"/>
+            <a:ext cx="10972800" cy="4756151"/>
+          </a:xfrm>
+        </p:spPr>
+        <p:txBody>
+          <a:bodyPr anchor="t" anchorCtr="0">
+            <a:normAutofit fontScale="92500"/>
+          </a:bodyPr>
+          <a:lstStyle/>
+          <a:p>
+            <a:pPr marL="0" indent="0">
+              <a:buNone/>
+            </a:pPr>
+            <a:r>
+              <a:rPr lang="en-US" dirty="0"/>
+              <a:t>Before we go further on this topic….</a:t>
+            </a:r>
+          </a:p>
+          <a:p>
+            <a:r>
+              <a:rPr lang="en-US" dirty="0"/>
+              <a:t>This is a complex (and interesting!) topic in CS theory</a:t>
+            </a:r>
+          </a:p>
+          <a:p>
+            <a:r>
+              <a:rPr lang="en-US" dirty="0"/>
+              <a:t>In our few lectures, we may approach things from a simpler viewpoint than you’d get in a CS theory course</a:t>
+            </a:r>
+          </a:p>
+          <a:p>
+            <a:endParaRPr lang="en-US" dirty="0"/>
+          </a:p>
+          <a:p>
+            <a:r>
+              <a:rPr lang="en-US" dirty="0"/>
+              <a:t>The math and theory related to NP-complete problems starts with </a:t>
+            </a:r>
+            <a:r>
+              <a:rPr lang="en-US" b="1" i="1" dirty="0"/>
+              <a:t>decision problems</a:t>
+            </a:r>
+          </a:p>
+          <a:p>
+            <a:pPr lvl="1"/>
+            <a:r>
+              <a:rPr lang="en-US" dirty="0"/>
+              <a:t>What’s that?  Let’s use vertex cover as an example</a:t>
+            </a:r>
+          </a:p>
+          <a:p>
+            <a:pPr lvl="1"/>
+            <a:r>
+              <a:rPr lang="en-US" dirty="0"/>
+              <a:t>What’s described next applies to any optimization problems we’ve seen</a:t>
+            </a:r>
+          </a:p>
+          <a:p>
+            <a:endParaRPr lang="en-US" dirty="0"/>
+          </a:p>
+          <a:p>
+            <a:endParaRPr lang="en-US" dirty="0"/>
+          </a:p>
+          <a:p>
+            <a:pPr lvl="1"/>
+            <a:endParaRPr lang="en-US" dirty="0"/>
+          </a:p>
+        </p:txBody>
+      </p:sp>
+      <p:sp>
+        <p:nvSpPr>
+          <p:cNvPr id="4" name="Slide Number Placeholder 3">
+            <a:extLst>
+              <a:ext uri="{FF2B5EF4-FFF2-40B4-BE49-F238E27FC236}">
+                <a16:creationId xmlns:a16="http://schemas.microsoft.com/office/drawing/2014/main" id="{77C09992-77A5-DF4B-9481-0C319EF9A4C4}"/>
+              </a:ext>
+            </a:extLst>
+          </p:cNvPr>
+          <p:cNvSpPr>
+            <a:spLocks noGrp="1"/>
+          </p:cNvSpPr>
+          <p:nvPr>
+            <p:ph type="sldNum" sz="quarter" idx="12"/>
+          </p:nvPr>
+        </p:nvSpPr>
+        <p:spPr/>
+        <p:txBody>
+          <a:bodyPr/>
+          <a:lstStyle/>
+          <a:p>
+            <a:fld id="{86BADE50-950A-4D58-BFB2-FA2C6A8B385D}" type="slidenum">
+              <a:rPr lang="en-US" smtClean="0"/>
+              <a:t>2</a:t>
+            </a:fld>
+            <a:endParaRPr lang="en-US"/>
+          </a:p>
+        </p:txBody>
+      </p:sp>
+    </p:spTree>
+    <p:extLst>
+      <p:ext uri="{BB962C8B-B14F-4D97-AF65-F5344CB8AC3E}">
+        <p14:creationId xmlns:p14="http://schemas.microsoft.com/office/powerpoint/2010/main" val="2247289439"/>
+      </p:ext>
+    </p:extLst>
+  </p:cSld>
+  <p:clrMapOvr>
+    <a:masterClrMapping/>
+  </p:clrMapOvr>
+</p:sld>
+</file>
+
+<file path=ppt/slides/slide20.xml><?xml version="1.0" encoding="utf-8"?>
 <p:sld xmlns:a="http://schemas.openxmlformats.org/drawingml/2006/main" xmlns:r="http://schemas.openxmlformats.org/officeDocument/2006/relationships" xmlns:p="http://schemas.openxmlformats.org/presentationml/2006/main">
   <p:cSld>
     <p:spTree>
@@ -14710,7 +15016,7 @@
           <a:p>
             <a:fld id="{86BADE50-950A-4D58-BFB2-FA2C6A8B385D}" type="slidenum">
               <a:rPr lang="en-US" smtClean="0"/>
-              <a:t>19</a:t>
+              <a:t>20</a:t>
             </a:fld>
             <a:endParaRPr lang="en-US"/>
           </a:p>
@@ -16408,181 +16714,7 @@
 </p:sld>
 </file>
 
-<file path=ppt/slides/slide2.xml><?xml version="1.0" encoding="utf-8"?>
-<p:sld xmlns:a="http://schemas.openxmlformats.org/drawingml/2006/main" xmlns:r="http://schemas.openxmlformats.org/officeDocument/2006/relationships" xmlns:p="http://schemas.openxmlformats.org/presentationml/2006/main">
-  <p:cSld>
-    <p:spTree>
-      <p:nvGrpSpPr>
-        <p:cNvPr id="1" name=""/>
-        <p:cNvGrpSpPr/>
-        <p:nvPr/>
-      </p:nvGrpSpPr>
-      <p:grpSpPr>
-        <a:xfrm>
-          <a:off x="0" y="0"/>
-          <a:ext cx="0" cy="0"/>
-          <a:chOff x="0" y="0"/>
-          <a:chExt cx="0" cy="0"/>
-        </a:xfrm>
-      </p:grpSpPr>
-      <p:sp>
-        <p:nvSpPr>
-          <p:cNvPr id="2" name="Title 1">
-            <a:extLst>
-              <a:ext uri="{FF2B5EF4-FFF2-40B4-BE49-F238E27FC236}">
-                <a16:creationId xmlns:a16="http://schemas.microsoft.com/office/drawing/2014/main" id="{7F398ADC-F6F6-C043-8CC0-36C31B64D1C1}"/>
-              </a:ext>
-            </a:extLst>
-          </p:cNvPr>
-          <p:cNvSpPr>
-            <a:spLocks noGrp="1"/>
-          </p:cNvSpPr>
-          <p:nvPr>
-            <p:ph type="title"/>
-          </p:nvPr>
-        </p:nvSpPr>
-        <p:spPr/>
-        <p:txBody>
-          <a:bodyPr/>
-          <a:lstStyle/>
-          <a:p>
-            <a:r>
-              <a:rPr lang="en-US" dirty="0"/>
-              <a:t>Some Preliminaries</a:t>
-            </a:r>
-          </a:p>
-        </p:txBody>
-      </p:sp>
-      <p:sp>
-        <p:nvSpPr>
-          <p:cNvPr id="3" name="Content Placeholder 2">
-            <a:extLst>
-              <a:ext uri="{FF2B5EF4-FFF2-40B4-BE49-F238E27FC236}">
-                <a16:creationId xmlns:a16="http://schemas.microsoft.com/office/drawing/2014/main" id="{A60538D5-BB5F-F043-9A7C-1C14D0119429}"/>
-              </a:ext>
-            </a:extLst>
-          </p:cNvPr>
-          <p:cNvSpPr>
-            <a:spLocks noGrp="1"/>
-          </p:cNvSpPr>
-          <p:nvPr>
-            <p:ph idx="1"/>
-          </p:nvPr>
-        </p:nvSpPr>
-        <p:spPr>
-          <a:xfrm>
-            <a:off x="609600" y="1600200"/>
-            <a:ext cx="10972800" cy="4756151"/>
-          </a:xfrm>
-        </p:spPr>
-        <p:txBody>
-          <a:bodyPr anchor="t" anchorCtr="0">
-            <a:normAutofit fontScale="92500"/>
-          </a:bodyPr>
-          <a:lstStyle/>
-          <a:p>
-            <a:pPr marL="0" indent="0">
-              <a:buNone/>
-            </a:pPr>
-            <a:r>
-              <a:rPr lang="en-US" dirty="0"/>
-              <a:t>Before we go further on this topic….</a:t>
-            </a:r>
-          </a:p>
-          <a:p>
-            <a:r>
-              <a:rPr lang="en-US" dirty="0"/>
-              <a:t>This is a complex (and interesting!) topic in CS theory</a:t>
-            </a:r>
-          </a:p>
-          <a:p>
-            <a:r>
-              <a:rPr lang="en-US" dirty="0"/>
-              <a:t>In our few lectures, we may approach things from a simpler viewpoint than you’d get in a CS theory course</a:t>
-            </a:r>
-          </a:p>
-          <a:p>
-            <a:endParaRPr lang="en-US" dirty="0"/>
-          </a:p>
-          <a:p>
-            <a:r>
-              <a:rPr lang="en-US" dirty="0"/>
-              <a:t>The math and theory related to NP-complete problems starts with </a:t>
-            </a:r>
-            <a:r>
-              <a:rPr lang="en-US" b="1" i="1" dirty="0"/>
-              <a:t>decision problems</a:t>
-            </a:r>
-          </a:p>
-          <a:p>
-            <a:pPr lvl="1"/>
-            <a:r>
-              <a:rPr lang="en-US" dirty="0"/>
-              <a:t>What’s that?  Let’s use vertex cover as an example</a:t>
-            </a:r>
-          </a:p>
-          <a:p>
-            <a:pPr lvl="1"/>
-            <a:r>
-              <a:rPr lang="en-US" dirty="0"/>
-              <a:t>What’s described next applies to any optimization problems we’ve seen</a:t>
-            </a:r>
-          </a:p>
-          <a:p>
-            <a:endParaRPr lang="en-US" dirty="0"/>
-          </a:p>
-          <a:p>
-            <a:endParaRPr lang="en-US" dirty="0"/>
-          </a:p>
-          <a:p>
-            <a:pPr lvl="1"/>
-            <a:endParaRPr lang="en-US" dirty="0"/>
-          </a:p>
-        </p:txBody>
-      </p:sp>
-      <p:sp>
-        <p:nvSpPr>
-          <p:cNvPr id="4" name="Slide Number Placeholder 3">
-            <a:extLst>
-              <a:ext uri="{FF2B5EF4-FFF2-40B4-BE49-F238E27FC236}">
-                <a16:creationId xmlns:a16="http://schemas.microsoft.com/office/drawing/2014/main" id="{77C09992-77A5-DF4B-9481-0C319EF9A4C4}"/>
-              </a:ext>
-            </a:extLst>
-          </p:cNvPr>
-          <p:cNvSpPr>
-            <a:spLocks noGrp="1"/>
-          </p:cNvSpPr>
-          <p:nvPr>
-            <p:ph type="sldNum" sz="quarter" idx="12"/>
-          </p:nvPr>
-        </p:nvSpPr>
-        <p:spPr/>
-        <p:txBody>
-          <a:bodyPr/>
-          <a:lstStyle/>
-          <a:p>
-            <a:fld id="{86BADE50-950A-4D58-BFB2-FA2C6A8B385D}" type="slidenum">
-              <a:rPr lang="en-US" smtClean="0"/>
-              <a:t>2</a:t>
-            </a:fld>
-            <a:endParaRPr lang="en-US"/>
-          </a:p>
-        </p:txBody>
-      </p:sp>
-    </p:spTree>
-    <p:extLst>
-      <p:ext uri="{BB962C8B-B14F-4D97-AF65-F5344CB8AC3E}">
-        <p14:creationId xmlns:p14="http://schemas.microsoft.com/office/powerpoint/2010/main" val="2247289439"/>
-      </p:ext>
-    </p:extLst>
-  </p:cSld>
-  <p:clrMapOvr>
-    <a:masterClrMapping/>
-  </p:clrMapOvr>
-</p:sld>
-</file>
-
-<file path=ppt/slides/slide20.xml><?xml version="1.0" encoding="utf-8"?>
+<file path=ppt/slides/slide21.xml><?xml version="1.0" encoding="utf-8"?>
 <p:sld xmlns:a="http://schemas.openxmlformats.org/drawingml/2006/main" xmlns:r="http://schemas.openxmlformats.org/officeDocument/2006/relationships" xmlns:p="http://schemas.openxmlformats.org/presentationml/2006/main">
   <p:cSld>
     <p:spTree>
@@ -16720,7 +16852,7 @@
           <a:p>
             <a:fld id="{86BADE50-950A-4D58-BFB2-FA2C6A8B385D}" type="slidenum">
               <a:rPr lang="en-US" smtClean="0"/>
-              <a:t>20</a:t>
+              <a:t>21</a:t>
             </a:fld>
             <a:endParaRPr lang="en-US"/>
           </a:p>
@@ -16739,7 +16871,7 @@
 </p:sld>
 </file>
 
-<file path=ppt/slides/slide21.xml><?xml version="1.0" encoding="utf-8"?>
+<file path=ppt/slides/slide22.xml><?xml version="1.0" encoding="utf-8"?>
 <p:sld xmlns:a="http://schemas.openxmlformats.org/drawingml/2006/main" xmlns:r="http://schemas.openxmlformats.org/officeDocument/2006/relationships" xmlns:p="http://schemas.openxmlformats.org/presentationml/2006/main" showMasterPhAnim="0">
   <p:cSld>
     <p:spTree>
@@ -17444,7 +17576,7 @@
 </p:sld>
 </file>
 
-<file path=ppt/slides/slide22.xml><?xml version="1.0" encoding="utf-8"?>
+<file path=ppt/slides/slide23.xml><?xml version="1.0" encoding="utf-8"?>
 <p:sld xmlns:a="http://schemas.openxmlformats.org/drawingml/2006/main" xmlns:r="http://schemas.openxmlformats.org/officeDocument/2006/relationships" xmlns:p="http://schemas.openxmlformats.org/presentationml/2006/main">
   <p:cSld>
     <p:spTree>
@@ -18248,7 +18380,7 @@
 </p:sld>
 </file>
 
-<file path=ppt/slides/slide23.xml><?xml version="1.0" encoding="utf-8"?>
+<file path=ppt/slides/slide24.xml><?xml version="1.0" encoding="utf-8"?>
 <p:sld xmlns:a="http://schemas.openxmlformats.org/drawingml/2006/main" xmlns:r="http://schemas.openxmlformats.org/officeDocument/2006/relationships" xmlns:p="http://schemas.openxmlformats.org/presentationml/2006/main">
   <p:cSld>
     <p:spTree>
@@ -18467,7 +18599,7 @@
           <a:p>
             <a:fld id="{86BADE50-950A-4D58-BFB2-FA2C6A8B385D}" type="slidenum">
               <a:rPr lang="en-US" smtClean="0"/>
-              <a:t>23</a:t>
+              <a:t>24</a:t>
             </a:fld>
             <a:endParaRPr lang="en-US"/>
           </a:p>
@@ -18486,7 +18618,7 @@
 </p:sld>
 </file>
 
-<file path=ppt/slides/slide24.xml><?xml version="1.0" encoding="utf-8"?>
+<file path=ppt/slides/slide25.xml><?xml version="1.0" encoding="utf-8"?>
 <p:sld xmlns:a="http://schemas.openxmlformats.org/drawingml/2006/main" xmlns:r="http://schemas.openxmlformats.org/officeDocument/2006/relationships" xmlns:p="http://schemas.openxmlformats.org/presentationml/2006/main">
   <p:cSld>
     <p:spTree>
@@ -18562,7 +18694,7 @@
             <a:fld id="{A8D2B1A1-9A82-492A-87A6-500459A044C8}" type="slidenum">
               <a:rPr lang="en-US" smtClean="0"/>
               <a:pPr/>
-              <a:t>24</a:t>
+              <a:t>25</a:t>
             </a:fld>
             <a:endParaRPr lang="en-US"/>
           </a:p>
@@ -18581,7 +18713,7 @@
 </p:sld>
 </file>
 
-<file path=ppt/slides/slide25.xml><?xml version="1.0" encoding="utf-8"?>
+<file path=ppt/slides/slide26.xml><?xml version="1.0" encoding="utf-8"?>
 <p:sld xmlns:a="http://schemas.openxmlformats.org/drawingml/2006/main" xmlns:r="http://schemas.openxmlformats.org/officeDocument/2006/relationships" xmlns:p="http://schemas.openxmlformats.org/presentationml/2006/main">
   <p:cSld>
     <p:spTree>
@@ -18866,7 +18998,7 @@
 </p:sld>
 </file>
 
-<file path=ppt/slides/slide26.xml><?xml version="1.0" encoding="utf-8"?>
+<file path=ppt/slides/slide27.xml><?xml version="1.0" encoding="utf-8"?>
 <p:sld xmlns:a="http://schemas.openxmlformats.org/drawingml/2006/main" xmlns:r="http://schemas.openxmlformats.org/officeDocument/2006/relationships" xmlns:p="http://schemas.openxmlformats.org/presentationml/2006/main">
   <p:cSld>
     <p:spTree>
@@ -19221,7 +19353,7 @@
 </p:sld>
 </file>
 
-<file path=ppt/slides/slide27.xml><?xml version="1.0" encoding="utf-8"?>
+<file path=ppt/slides/slide28.xml><?xml version="1.0" encoding="utf-8"?>
 <p:sld xmlns:a="http://schemas.openxmlformats.org/drawingml/2006/main" xmlns:r="http://schemas.openxmlformats.org/officeDocument/2006/relationships" xmlns:p="http://schemas.openxmlformats.org/presentationml/2006/main">
   <p:cSld>
     <p:spTree>
@@ -19297,7 +19429,7 @@
             <a:fld id="{A8D2B1A1-9A82-492A-87A6-500459A044C8}" type="slidenum">
               <a:rPr lang="en-US" smtClean="0"/>
               <a:pPr/>
-              <a:t>27</a:t>
+              <a:t>28</a:t>
             </a:fld>
             <a:endParaRPr lang="en-US"/>
           </a:p>
@@ -19316,7 +19448,7 @@
 </p:sld>
 </file>
 
-<file path=ppt/slides/slide28.xml><?xml version="1.0" encoding="utf-8"?>
+<file path=ppt/slides/slide29.xml><?xml version="1.0" encoding="utf-8"?>
 <p:sld xmlns:a="http://schemas.openxmlformats.org/drawingml/2006/main" xmlns:r="http://schemas.openxmlformats.org/officeDocument/2006/relationships" xmlns:p="http://schemas.openxmlformats.org/presentationml/2006/main">
   <p:cSld>
     <p:spTree>
@@ -19777,192 +19909,6 @@
     <p:extLst>
       <p:ext uri="{BB962C8B-B14F-4D97-AF65-F5344CB8AC3E}">
         <p14:creationId xmlns:p14="http://schemas.microsoft.com/office/powerpoint/2010/main" val="915470115"/>
-      </p:ext>
-    </p:extLst>
-  </p:cSld>
-  <p:clrMapOvr>
-    <a:masterClrMapping/>
-  </p:clrMapOvr>
-</p:sld>
-</file>
-
-<file path=ppt/slides/slide29.xml><?xml version="1.0" encoding="utf-8"?>
-<p:sld xmlns:a="http://schemas.openxmlformats.org/drawingml/2006/main" xmlns:r="http://schemas.openxmlformats.org/officeDocument/2006/relationships" xmlns:p="http://schemas.openxmlformats.org/presentationml/2006/main">
-  <p:cSld>
-    <p:spTree>
-      <p:nvGrpSpPr>
-        <p:cNvPr id="1" name=""/>
-        <p:cNvGrpSpPr/>
-        <p:nvPr/>
-      </p:nvGrpSpPr>
-      <p:grpSpPr>
-        <a:xfrm>
-          <a:off x="0" y="0"/>
-          <a:ext cx="0" cy="0"/>
-          <a:chOff x="0" y="0"/>
-          <a:chExt cx="0" cy="0"/>
-        </a:xfrm>
-      </p:grpSpPr>
-      <p:sp>
-        <p:nvSpPr>
-          <p:cNvPr id="26625" name="Rectangle 2">
-            <a:extLst>
-              <a:ext uri="{FF2B5EF4-FFF2-40B4-BE49-F238E27FC236}">
-                <a16:creationId xmlns:a16="http://schemas.microsoft.com/office/drawing/2014/main" id="{F080C729-7865-3741-BBDF-77747ECC8D0B}"/>
-              </a:ext>
-            </a:extLst>
-          </p:cNvPr>
-          <p:cNvSpPr>
-            <a:spLocks noGrp="1" noChangeArrowheads="1"/>
-          </p:cNvSpPr>
-          <p:nvPr>
-            <p:ph type="title"/>
-            <p:custDataLst>
-              <p:tags r:id="rId1"/>
-            </p:custDataLst>
-          </p:nvPr>
-        </p:nvSpPr>
-        <p:spPr/>
-        <p:txBody>
-          <a:bodyPr/>
-          <a:lstStyle/>
-          <a:p>
-            <a:r>
-              <a:rPr lang="en-US" altLang="en-US">
-                <a:ea typeface="ＭＳ Ｐゴシック" panose="020B0600070205080204" pitchFamily="34" charset="-128"/>
-              </a:rPr>
-              <a:t>The 3-CNF Problem</a:t>
-            </a:r>
-          </a:p>
-        </p:txBody>
-      </p:sp>
-      <p:sp>
-        <p:nvSpPr>
-          <p:cNvPr id="26626" name="Rectangle 3">
-            <a:extLst>
-              <a:ext uri="{FF2B5EF4-FFF2-40B4-BE49-F238E27FC236}">
-                <a16:creationId xmlns:a16="http://schemas.microsoft.com/office/drawing/2014/main" id="{C11A355F-7E96-914D-9499-4F72520C556E}"/>
-              </a:ext>
-            </a:extLst>
-          </p:cNvPr>
-          <p:cNvSpPr>
-            <a:spLocks noGrp="1" noChangeArrowheads="1"/>
-          </p:cNvSpPr>
-          <p:nvPr>
-            <p:ph type="body" idx="1"/>
-            <p:custDataLst>
-              <p:tags r:id="rId2"/>
-            </p:custDataLst>
-          </p:nvPr>
-        </p:nvSpPr>
-        <p:spPr/>
-        <p:txBody>
-          <a:bodyPr/>
-          <a:lstStyle/>
-          <a:p>
-            <a:pPr>
-              <a:lnSpc>
-                <a:spcPct val="90000"/>
-              </a:lnSpc>
-            </a:pPr>
-            <a:r>
-              <a:rPr lang="en-US" altLang="en-US" dirty="0">
-                <a:ea typeface="ＭＳ Ｐゴシック" panose="020B0600070205080204" pitchFamily="34" charset="-128"/>
-              </a:rPr>
-              <a:t>Satisfiability of Boolean formulas in 3-CNF form (the </a:t>
-            </a:r>
-            <a:r>
-              <a:rPr lang="en-US" altLang="en-US" i="1" dirty="0">
-                <a:solidFill>
-                  <a:schemeClr val="tx2"/>
-                </a:solidFill>
-                <a:ea typeface="ＭＳ Ｐゴシック" panose="020B0600070205080204" pitchFamily="34" charset="-128"/>
-              </a:rPr>
-              <a:t>3-CNF Problem</a:t>
-            </a:r>
-            <a:r>
-              <a:rPr lang="en-US" altLang="en-US" dirty="0">
-                <a:ea typeface="ＭＳ Ｐゴシック" panose="020B0600070205080204" pitchFamily="34" charset="-128"/>
-              </a:rPr>
-              <a:t>) is NP-Complete</a:t>
-            </a:r>
-          </a:p>
-          <a:p>
-            <a:pPr lvl="1">
-              <a:lnSpc>
-                <a:spcPct val="90000"/>
-              </a:lnSpc>
-            </a:pPr>
-            <a:r>
-              <a:rPr lang="en-US" altLang="en-US" dirty="0">
-                <a:ea typeface="ＭＳ Ｐゴシック" panose="020B0600070205080204" pitchFamily="34" charset="-128"/>
-              </a:rPr>
-              <a:t>Proof: Also done by Cook (“part 2” of Cook’s theorem)</a:t>
-            </a:r>
-          </a:p>
-          <a:p>
-            <a:pPr lvl="1">
-              <a:lnSpc>
-                <a:spcPct val="90000"/>
-              </a:lnSpc>
-            </a:pPr>
-            <a:r>
-              <a:rPr lang="en-US" altLang="en-US" dirty="0">
-                <a:ea typeface="ＭＳ Ｐゴシック" panose="020B0600070205080204" pitchFamily="34" charset="-128"/>
-                <a:sym typeface="Symbol" pitchFamily="2" charset="2"/>
-              </a:rPr>
-              <a:t>But it’s not that hard to show SAT </a:t>
-            </a:r>
-            <a:r>
-              <a:rPr lang="en-US" altLang="en-US" baseline="-25000" dirty="0">
-                <a:ea typeface="ＭＳ Ｐゴシック" panose="020B0600070205080204" pitchFamily="34" charset="-128"/>
-                <a:sym typeface="Symbol" pitchFamily="2" charset="2"/>
-              </a:rPr>
-              <a:t>p</a:t>
-            </a:r>
-            <a:r>
-              <a:rPr lang="en-US" altLang="en-US" dirty="0">
-                <a:ea typeface="ＭＳ Ｐゴシック" panose="020B0600070205080204" pitchFamily="34" charset="-128"/>
-                <a:sym typeface="Symbol" pitchFamily="2" charset="2"/>
-              </a:rPr>
-              <a:t> 3-CNF</a:t>
-            </a:r>
-            <a:endParaRPr lang="en-US" altLang="en-US" dirty="0">
-              <a:ea typeface="ＭＳ Ｐゴシック" panose="020B0600070205080204" pitchFamily="34" charset="-128"/>
-            </a:endParaRPr>
-          </a:p>
-          <a:p>
-            <a:pPr>
-              <a:lnSpc>
-                <a:spcPct val="90000"/>
-              </a:lnSpc>
-            </a:pPr>
-            <a:r>
-              <a:rPr lang="en-US" altLang="en-US" dirty="0">
-                <a:ea typeface="ＭＳ Ｐゴシック" panose="020B0600070205080204" pitchFamily="34" charset="-128"/>
-              </a:rPr>
-              <a:t>The reason we care about the 3-CNF problem is that it is relatively easy to reduce to others </a:t>
-            </a:r>
-          </a:p>
-          <a:p>
-            <a:pPr lvl="1">
-              <a:lnSpc>
-                <a:spcPct val="90000"/>
-              </a:lnSpc>
-            </a:pPr>
-            <a:r>
-              <a:rPr lang="en-US" altLang="en-US" dirty="0">
-                <a:ea typeface="ＭＳ Ｐゴシック" panose="020B0600070205080204" pitchFamily="34" charset="-128"/>
-              </a:rPr>
-              <a:t>Thus by proving 3-CNF is NP-Complete we can prove many seemingly unrelated problems are NP-Complete</a:t>
-            </a:r>
-          </a:p>
-        </p:txBody>
-      </p:sp>
-    </p:spTree>
-    <p:extLst>
-      <p:ext uri="{BB962C8B-B14F-4D97-AF65-F5344CB8AC3E}">
-        <p14:creationId xmlns:p14="http://schemas.microsoft.com/office/powerpoint/2010/main" val="2780942345"/>
       </p:ext>
     </p:extLst>
   </p:cSld>
@@ -20489,12 +20435,21 @@
       </p:grpSpPr>
       <p:sp>
         <p:nvSpPr>
-          <p:cNvPr id="2" name="Title 1"/>
+          <p:cNvPr id="26625" name="Rectangle 2">
+            <a:extLst>
+              <a:ext uri="{FF2B5EF4-FFF2-40B4-BE49-F238E27FC236}">
+                <a16:creationId xmlns:a16="http://schemas.microsoft.com/office/drawing/2014/main" id="{F080C729-7865-3741-BBDF-77747ECC8D0B}"/>
+              </a:ext>
+            </a:extLst>
+          </p:cNvPr>
           <p:cNvSpPr>
-            <a:spLocks noGrp="1"/>
+            <a:spLocks noGrp="1" noChangeArrowheads="1"/>
           </p:cNvSpPr>
           <p:nvPr>
             <p:ph type="title"/>
+            <p:custDataLst>
+              <p:tags r:id="rId1"/>
+            </p:custDataLst>
           </p:nvPr>
         </p:nvSpPr>
         <p:spPr/>
@@ -20503,20 +20458,31 @@
           <a:lstStyle/>
           <a:p>
             <a:r>
-              <a:rPr lang="en-US" dirty="0"/>
-              <a:t>Showing 3-SAT is NP-complete</a:t>
+              <a:rPr lang="en-US" altLang="en-US">
+                <a:ea typeface="ＭＳ Ｐゴシック" panose="020B0600070205080204" pitchFamily="34" charset="-128"/>
+              </a:rPr>
+              <a:t>The 3-CNF Problem</a:t>
             </a:r>
           </a:p>
         </p:txBody>
       </p:sp>
       <p:sp>
         <p:nvSpPr>
-          <p:cNvPr id="4" name="Slide Number Placeholder 3"/>
+          <p:cNvPr id="26626" name="Rectangle 3">
+            <a:extLst>
+              <a:ext uri="{FF2B5EF4-FFF2-40B4-BE49-F238E27FC236}">
+                <a16:creationId xmlns:a16="http://schemas.microsoft.com/office/drawing/2014/main" id="{C11A355F-7E96-914D-9499-4F72520C556E}"/>
+              </a:ext>
+            </a:extLst>
+          </p:cNvPr>
           <p:cNvSpPr>
-            <a:spLocks noGrp="1"/>
+            <a:spLocks noGrp="1" noChangeArrowheads="1"/>
           </p:cNvSpPr>
           <p:nvPr>
-            <p:ph type="sldNum" sz="quarter" idx="12"/>
+            <p:ph type="body" idx="1"/>
+            <p:custDataLst>
+              <p:tags r:id="rId2"/>
+            </p:custDataLst>
           </p:nvPr>
         </p:nvSpPr>
         <p:spPr/>
@@ -20524,201 +20490,109 @@
           <a:bodyPr/>
           <a:lstStyle/>
           <a:p>
-            <a:fld id="{A8D2B1A1-9A82-492A-87A6-500459A044C8}" type="slidenum">
-              <a:rPr lang="en-US" smtClean="0"/>
-              <a:pPr/>
-              <a:t>30</a:t>
-            </a:fld>
-            <a:endParaRPr lang="en-US"/>
-          </a:p>
-        </p:txBody>
-      </p:sp>
-      <p:sp>
-        <p:nvSpPr>
-          <p:cNvPr id="3" name="Content Placeholder 2"/>
-          <p:cNvSpPr>
-            <a:spLocks noGrp="1"/>
-          </p:cNvSpPr>
-          <p:nvPr>
-            <p:ph sz="quarter" idx="1"/>
-          </p:nvPr>
-        </p:nvSpPr>
-        <p:spPr/>
-        <p:txBody>
-          <a:bodyPr>
-            <a:normAutofit fontScale="85000" lnSpcReduction="20000"/>
-          </a:bodyPr>
-          <a:lstStyle/>
-          <a:p>
-            <a:r>
-              <a:rPr lang="en-US" dirty="0"/>
-              <a:t>First, we must show it’s in NP</a:t>
-            </a:r>
-          </a:p>
-          <a:p>
-            <a:pPr lvl="1"/>
-            <a:r>
-              <a:rPr lang="en-US" dirty="0"/>
-              <a:t>A NTM can decide it in polynomial time</a:t>
-            </a:r>
-          </a:p>
-          <a:p>
-            <a:pPr lvl="1"/>
-            <a:r>
-              <a:rPr lang="en-US" dirty="0"/>
-              <a:t>Rephrased: it can be verified by a DTM in polynomial time</a:t>
-            </a:r>
-          </a:p>
-          <a:p>
-            <a:pPr lvl="2"/>
-            <a:r>
-              <a:rPr lang="en-US" dirty="0"/>
-              <a:t>The equivalence of those two statements is on slide 30</a:t>
-            </a:r>
-          </a:p>
-          <a:p>
-            <a:pPr lvl="2"/>
-            <a:r>
-              <a:rPr lang="en-US" dirty="0"/>
-              <a:t>This second one is easy to show</a:t>
-            </a:r>
-          </a:p>
-          <a:p>
-            <a:pPr lvl="2"/>
-            <a:r>
-              <a:rPr lang="en-US" dirty="0"/>
-              <a:t>A formal proof would require showing </a:t>
-            </a:r>
-            <a:r>
-              <a:rPr lang="en-US" i="1" dirty="0"/>
-              <a:t>how</a:t>
-            </a:r>
-            <a:r>
-              <a:rPr lang="en-US" dirty="0"/>
-              <a:t>, which I’ll do verbally</a:t>
-            </a:r>
-          </a:p>
-          <a:p>
-            <a:r>
-              <a:rPr lang="en-US" dirty="0"/>
-              <a:t>Next we must show that 3-SAT is NP-hard: that we can reduce an NP-complete problem </a:t>
-            </a:r>
-            <a:r>
-              <a:rPr lang="en-US" i="1" dirty="0"/>
-              <a:t>to</a:t>
-            </a:r>
-            <a:r>
-              <a:rPr lang="en-US" dirty="0"/>
-              <a:t> 3-SAT</a:t>
-            </a:r>
-          </a:p>
-          <a:p>
-            <a:pPr lvl="1"/>
-            <a:r>
-              <a:rPr lang="en-US" dirty="0"/>
-              <a:t>Not surprisingly, we choose SAT</a:t>
-            </a:r>
-          </a:p>
-          <a:p>
-            <a:pPr lvl="1"/>
-            <a:endParaRPr lang="en-US" dirty="0"/>
-          </a:p>
-          <a:p>
-            <a:r>
-              <a:rPr lang="en-US" dirty="0"/>
-              <a:t>We’ll consider the following formula:</a:t>
-            </a:r>
-          </a:p>
-          <a:p>
-            <a:r>
-              <a:rPr lang="en-US" dirty="0">
-                <a:sym typeface="Symbol"/>
-              </a:rPr>
-              <a:t> = ((x</a:t>
-            </a:r>
-            <a:r>
-              <a:rPr lang="en-US" baseline="-25000" dirty="0">
-                <a:sym typeface="Symbol"/>
-              </a:rPr>
-              <a:t>1</a:t>
-            </a:r>
-            <a:r>
-              <a:rPr lang="en-US" dirty="0">
-                <a:sym typeface="Symbol"/>
-              </a:rPr>
-              <a:t>  x</a:t>
-            </a:r>
-            <a:r>
-              <a:rPr lang="en-US" baseline="-25000" dirty="0">
-                <a:sym typeface="Symbol"/>
-              </a:rPr>
-              <a:t>2</a:t>
-            </a:r>
-            <a:r>
-              <a:rPr lang="en-US" dirty="0">
-                <a:sym typeface="Symbol"/>
-              </a:rPr>
-              <a:t>)  ((x</a:t>
-            </a:r>
-            <a:r>
-              <a:rPr lang="en-US" baseline="-25000" dirty="0">
-                <a:sym typeface="Symbol"/>
-              </a:rPr>
-              <a:t>1</a:t>
-            </a:r>
-            <a:r>
-              <a:rPr lang="en-US" dirty="0">
-                <a:sym typeface="Symbol"/>
-              </a:rPr>
-              <a:t>  x</a:t>
-            </a:r>
-            <a:r>
-              <a:rPr lang="en-US" baseline="-25000" dirty="0">
-                <a:sym typeface="Symbol"/>
-              </a:rPr>
-              <a:t>3</a:t>
-            </a:r>
-            <a:r>
-              <a:rPr lang="en-US" dirty="0">
-                <a:sym typeface="Symbol"/>
-              </a:rPr>
-              <a:t>)  x</a:t>
-            </a:r>
-            <a:r>
-              <a:rPr lang="en-US" baseline="-25000" dirty="0">
-                <a:sym typeface="Symbol"/>
-              </a:rPr>
-              <a:t>4</a:t>
-            </a:r>
-            <a:r>
-              <a:rPr lang="en-US" dirty="0">
-                <a:sym typeface="Symbol"/>
-              </a:rPr>
-              <a:t>))  x</a:t>
-            </a:r>
-            <a:r>
-              <a:rPr lang="en-US" baseline="-25000" dirty="0">
-                <a:sym typeface="Symbol"/>
-              </a:rPr>
-              <a:t>2</a:t>
-            </a:r>
-            <a:r>
-              <a:rPr lang="en-US" dirty="0">
-                <a:sym typeface="Symbol"/>
-              </a:rPr>
-              <a:t> </a:t>
-            </a:r>
-            <a:endParaRPr lang="en-US" dirty="0"/>
-          </a:p>
-          <a:p>
-            <a:endParaRPr lang="en-US" dirty="0"/>
+            <a:pPr>
+              <a:lnSpc>
+                <a:spcPct val="90000"/>
+              </a:lnSpc>
+            </a:pPr>
+            <a:r>
+              <a:rPr lang="en-US" altLang="en-US" dirty="0">
+                <a:ea typeface="ＭＳ Ｐゴシック" panose="020B0600070205080204" pitchFamily="34" charset="-128"/>
+              </a:rPr>
+              <a:t>Satisfiability of Boolean formulas in 3-CNF form (the </a:t>
+            </a:r>
+            <a:r>
+              <a:rPr lang="en-US" altLang="en-US" i="1" dirty="0">
+                <a:solidFill>
+                  <a:schemeClr val="tx2"/>
+                </a:solidFill>
+                <a:ea typeface="ＭＳ Ｐゴシック" panose="020B0600070205080204" pitchFamily="34" charset="-128"/>
+              </a:rPr>
+              <a:t>3-CNF Problem</a:t>
+            </a:r>
+            <a:r>
+              <a:rPr lang="en-US" altLang="en-US" dirty="0">
+                <a:ea typeface="ＭＳ Ｐゴシック" panose="020B0600070205080204" pitchFamily="34" charset="-128"/>
+              </a:rPr>
+              <a:t>) is NP-Complete</a:t>
+            </a:r>
+          </a:p>
+          <a:p>
+            <a:pPr lvl="1">
+              <a:lnSpc>
+                <a:spcPct val="90000"/>
+              </a:lnSpc>
+            </a:pPr>
+            <a:r>
+              <a:rPr lang="en-US" altLang="en-US" dirty="0">
+                <a:ea typeface="ＭＳ Ｐゴシック" panose="020B0600070205080204" pitchFamily="34" charset="-128"/>
+              </a:rPr>
+              <a:t>Proof: Also done by Cook (“part 2” of Cook’s theorem)</a:t>
+            </a:r>
+          </a:p>
+          <a:p>
+            <a:pPr lvl="1">
+              <a:lnSpc>
+                <a:spcPct val="90000"/>
+              </a:lnSpc>
+            </a:pPr>
+            <a:r>
+              <a:rPr lang="en-US" altLang="en-US" dirty="0">
+                <a:ea typeface="ＭＳ Ｐゴシック" panose="020B0600070205080204" pitchFamily="34" charset="-128"/>
+                <a:sym typeface="Symbol" pitchFamily="2" charset="2"/>
+              </a:rPr>
+              <a:t>But it’s not that hard to show SAT </a:t>
+            </a:r>
+            <a:r>
+              <a:rPr lang="en-US" altLang="en-US" baseline="-25000" dirty="0">
+                <a:ea typeface="ＭＳ Ｐゴシック" panose="020B0600070205080204" pitchFamily="34" charset="-128"/>
+                <a:sym typeface="Symbol" pitchFamily="2" charset="2"/>
+              </a:rPr>
+              <a:t>p</a:t>
+            </a:r>
+            <a:r>
+              <a:rPr lang="en-US" altLang="en-US" dirty="0">
+                <a:ea typeface="ＭＳ Ｐゴシック" panose="020B0600070205080204" pitchFamily="34" charset="-128"/>
+                <a:sym typeface="Symbol" pitchFamily="2" charset="2"/>
+              </a:rPr>
+              <a:t> 3-CNF</a:t>
+            </a:r>
+            <a:endParaRPr lang="en-US" altLang="en-US" dirty="0">
+              <a:ea typeface="ＭＳ Ｐゴシック" panose="020B0600070205080204" pitchFamily="34" charset="-128"/>
+            </a:endParaRPr>
+          </a:p>
+          <a:p>
+            <a:pPr>
+              <a:lnSpc>
+                <a:spcPct val="90000"/>
+              </a:lnSpc>
+            </a:pPr>
+            <a:r>
+              <a:rPr lang="en-US" altLang="en-US" dirty="0">
+                <a:ea typeface="ＭＳ Ｐゴシック" panose="020B0600070205080204" pitchFamily="34" charset="-128"/>
+              </a:rPr>
+              <a:t>The reason we care about the 3-CNF problem is that it is relatively easy to reduce to others </a:t>
+            </a:r>
+          </a:p>
+          <a:p>
+            <a:pPr lvl="1">
+              <a:lnSpc>
+                <a:spcPct val="90000"/>
+              </a:lnSpc>
+            </a:pPr>
+            <a:r>
+              <a:rPr lang="en-US" altLang="en-US" dirty="0">
+                <a:ea typeface="ＭＳ Ｐゴシック" panose="020B0600070205080204" pitchFamily="34" charset="-128"/>
+              </a:rPr>
+              <a:t>Thus by proving 3-CNF is NP-Complete we can prove many seemingly unrelated problems are NP-Complete</a:t>
+            </a:r>
           </a:p>
         </p:txBody>
       </p:sp>
     </p:spTree>
     <p:extLst>
       <p:ext uri="{BB962C8B-B14F-4D97-AF65-F5344CB8AC3E}">
-        <p14:creationId xmlns:p14="http://schemas.microsoft.com/office/powerpoint/2010/main" val="1477414987"/>
+        <p14:creationId xmlns:p14="http://schemas.microsoft.com/office/powerpoint/2010/main" val="2780942345"/>
       </p:ext>
     </p:extLst>
   </p:cSld>
@@ -20747,7 +20621,7 @@
       </p:grpSpPr>
       <p:sp>
         <p:nvSpPr>
-          <p:cNvPr id="5" name="Title 4"/>
+          <p:cNvPr id="2" name="Title 1"/>
           <p:cNvSpPr>
             <a:spLocks noGrp="1"/>
           </p:cNvSpPr>
@@ -20762,7 +20636,7 @@
           <a:p>
             <a:r>
               <a:rPr lang="en-US" dirty="0"/>
-              <a:t>Converting SAT to 3-SAT, step 1</a:t>
+              <a:t>Showing 3-SAT is NP-complete</a:t>
             </a:r>
           </a:p>
         </p:txBody>
@@ -20793,7 +20667,7 @@
       </p:sp>
       <p:sp>
         <p:nvSpPr>
-          <p:cNvPr id="6" name="Content Placeholder 5"/>
+          <p:cNvPr id="3" name="Content Placeholder 2"/>
           <p:cNvSpPr>
             <a:spLocks noGrp="1"/>
           </p:cNvSpPr>
@@ -20801,19 +20675,93 @@
             <p:ph sz="quarter" idx="1"/>
           </p:nvPr>
         </p:nvSpPr>
-        <p:spPr>
-          <a:xfrm>
-            <a:off x="304800" y="1904177"/>
-            <a:ext cx="7162800" cy="4496623"/>
-          </a:xfrm>
-        </p:spPr>
+        <p:spPr/>
         <p:txBody>
           <a:bodyPr>
-            <a:normAutofit/>
+            <a:normAutofit fontScale="85000" lnSpcReduction="20000"/>
           </a:bodyPr>
           <a:lstStyle/>
           <a:p>
-            <a:pPr algn="just"/>
+            <a:r>
+              <a:rPr lang="en-US" dirty="0"/>
+              <a:t>First, we must show it’s in NP</a:t>
+            </a:r>
+          </a:p>
+          <a:p>
+            <a:pPr lvl="1"/>
+            <a:r>
+              <a:rPr lang="en-US" dirty="0"/>
+              <a:t>A NTM can decide it in polynomial time</a:t>
+            </a:r>
+          </a:p>
+          <a:p>
+            <a:pPr lvl="1"/>
+            <a:r>
+              <a:rPr lang="en-US" dirty="0"/>
+              <a:t>Rephrased: it can be verified by a DTM in polynomial time</a:t>
+            </a:r>
+          </a:p>
+          <a:p>
+            <a:pPr lvl="2"/>
+            <a:r>
+              <a:rPr lang="en-US" dirty="0"/>
+              <a:t>The equivalence of those two statements is on slide 30</a:t>
+            </a:r>
+          </a:p>
+          <a:p>
+            <a:pPr lvl="2"/>
+            <a:r>
+              <a:rPr lang="en-US" dirty="0"/>
+              <a:t>This second one is easy to show</a:t>
+            </a:r>
+          </a:p>
+          <a:p>
+            <a:pPr lvl="2"/>
+            <a:r>
+              <a:rPr lang="en-US" dirty="0"/>
+              <a:t>A formal proof would require showing </a:t>
+            </a:r>
+            <a:r>
+              <a:rPr lang="en-US" i="1" dirty="0"/>
+              <a:t>how</a:t>
+            </a:r>
+            <a:r>
+              <a:rPr lang="en-US" dirty="0"/>
+              <a:t>, which I’ll do verbally</a:t>
+            </a:r>
+          </a:p>
+          <a:p>
+            <a:r>
+              <a:rPr lang="en-US" dirty="0"/>
+              <a:t>Next we must show that 3-SAT is NP-hard: that we can reduce an NP-complete problem </a:t>
+            </a:r>
+            <a:r>
+              <a:rPr lang="en-US" i="1" dirty="0"/>
+              <a:t>to</a:t>
+            </a:r>
+            <a:r>
+              <a:rPr lang="en-US" dirty="0"/>
+              <a:t> 3-SAT</a:t>
+            </a:r>
+          </a:p>
+          <a:p>
+            <a:pPr lvl="1"/>
+            <a:r>
+              <a:rPr lang="en-US" dirty="0"/>
+              <a:t>Not surprisingly, we choose SAT</a:t>
+            </a:r>
+          </a:p>
+          <a:p>
+            <a:pPr lvl="1"/>
+            <a:endParaRPr lang="en-US" dirty="0"/>
+          </a:p>
+          <a:p>
+            <a:r>
+              <a:rPr lang="en-US" dirty="0"/>
+              <a:t>We’ll consider the following formula:</a:t>
+            </a:r>
+          </a:p>
+          <a:p>
             <a:r>
               <a:rPr lang="en-US" dirty="0">
                 <a:sym typeface="Symbol"/>
@@ -20895,81 +20843,14 @@
             <a:endParaRPr lang="en-US" dirty="0"/>
           </a:p>
           <a:p>
-            <a:pPr algn="just"/>
             <a:endParaRPr lang="en-US" dirty="0"/>
-          </a:p>
-          <a:p>
-            <a:pPr algn="just"/>
-            <a:endParaRPr lang="en-US" dirty="0"/>
-          </a:p>
-          <a:p>
-            <a:pPr algn="just"/>
-            <a:r>
-              <a:rPr lang="en-US" dirty="0"/>
-              <a:t>We </a:t>
-            </a:r>
-            <a:r>
-              <a:rPr lang="en-US" i="1" dirty="0"/>
-              <a:t>parse</a:t>
-            </a:r>
-            <a:r>
-              <a:rPr lang="en-US" dirty="0"/>
-              <a:t> the expression into an expression tree</a:t>
-            </a:r>
-          </a:p>
-          <a:p>
-            <a:pPr lvl="1" algn="just"/>
-            <a:r>
-              <a:rPr lang="en-US" dirty="0"/>
-              <a:t>Standard Algorithm Applies</a:t>
-            </a:r>
-          </a:p>
-          <a:p>
-            <a:pPr algn="just"/>
-            <a:r>
-              <a:rPr lang="en-US" dirty="0"/>
-              <a:t>Since each operator (other than </a:t>
-            </a:r>
-            <a:r>
-              <a:rPr lang="en-US" dirty="0">
-                <a:sym typeface="Symbol"/>
-              </a:rPr>
-              <a:t></a:t>
-            </a:r>
-            <a:r>
-              <a:rPr lang="en-US" dirty="0"/>
-              <a:t>) is binary, it will be a binary tree</a:t>
-            </a:r>
           </a:p>
         </p:txBody>
       </p:sp>
-      <p:pic>
-        <p:nvPicPr>
-          <p:cNvPr id="8" name="Content Placeholder 7" descr="cormen-fig-34-11.png"/>
-          <p:cNvPicPr>
-            <a:picLocks noGrp="1" noChangeAspect="1"/>
-          </p:cNvPicPr>
-          <p:nvPr>
-            <p:ph sz="quarter" idx="2"/>
-          </p:nvPr>
-        </p:nvPicPr>
-        <p:blipFill>
-          <a:blip r:embed="rId2" cstate="print"/>
-          <a:stretch>
-            <a:fillRect/>
-          </a:stretch>
-        </p:blipFill>
-        <p:spPr>
-          <a:xfrm>
-            <a:off x="7507097" y="2209800"/>
-            <a:ext cx="4041775" cy="3773725"/>
-          </a:xfrm>
-        </p:spPr>
-      </p:pic>
     </p:spTree>
     <p:extLst>
       <p:ext uri="{BB962C8B-B14F-4D97-AF65-F5344CB8AC3E}">
-        <p14:creationId xmlns:p14="http://schemas.microsoft.com/office/powerpoint/2010/main" val="641961724"/>
+        <p14:creationId xmlns:p14="http://schemas.microsoft.com/office/powerpoint/2010/main" val="1477414987"/>
       </p:ext>
     </p:extLst>
   </p:cSld>
@@ -21013,7 +20894,7 @@
           <a:p>
             <a:r>
               <a:rPr lang="en-US" dirty="0"/>
-              <a:t>Converting SAT to 3-SAT, step 2</a:t>
+              <a:t>Converting SAT to 3-SAT, step 1</a:t>
             </a:r>
           </a:p>
         </p:txBody>
@@ -21037,6 +20918,257 @@
               <a:rPr lang="en-US" smtClean="0"/>
               <a:pPr/>
               <a:t>32</a:t>
+            </a:fld>
+            <a:endParaRPr lang="en-US"/>
+          </a:p>
+        </p:txBody>
+      </p:sp>
+      <p:sp>
+        <p:nvSpPr>
+          <p:cNvPr id="6" name="Content Placeholder 5"/>
+          <p:cNvSpPr>
+            <a:spLocks noGrp="1"/>
+          </p:cNvSpPr>
+          <p:nvPr>
+            <p:ph sz="quarter" idx="1"/>
+          </p:nvPr>
+        </p:nvSpPr>
+        <p:spPr>
+          <a:xfrm>
+            <a:off x="304800" y="1904177"/>
+            <a:ext cx="7162800" cy="4496623"/>
+          </a:xfrm>
+        </p:spPr>
+        <p:txBody>
+          <a:bodyPr>
+            <a:normAutofit/>
+          </a:bodyPr>
+          <a:lstStyle/>
+          <a:p>
+            <a:pPr algn="just"/>
+            <a:r>
+              <a:rPr lang="en-US" dirty="0">
+                <a:sym typeface="Symbol"/>
+              </a:rPr>
+              <a:t> = ((x</a:t>
+            </a:r>
+            <a:r>
+              <a:rPr lang="en-US" baseline="-25000" dirty="0">
+                <a:sym typeface="Symbol"/>
+              </a:rPr>
+              <a:t>1</a:t>
+            </a:r>
+            <a:r>
+              <a:rPr lang="en-US" dirty="0">
+                <a:sym typeface="Symbol"/>
+              </a:rPr>
+              <a:t>  x</a:t>
+            </a:r>
+            <a:r>
+              <a:rPr lang="en-US" baseline="-25000" dirty="0">
+                <a:sym typeface="Symbol"/>
+              </a:rPr>
+              <a:t>2</a:t>
+            </a:r>
+            <a:r>
+              <a:rPr lang="en-US" dirty="0">
+                <a:sym typeface="Symbol"/>
+              </a:rPr>
+              <a:t>)  ((x</a:t>
+            </a:r>
+            <a:r>
+              <a:rPr lang="en-US" baseline="-25000" dirty="0">
+                <a:sym typeface="Symbol"/>
+              </a:rPr>
+              <a:t>1</a:t>
+            </a:r>
+            <a:r>
+              <a:rPr lang="en-US" dirty="0">
+                <a:sym typeface="Symbol"/>
+              </a:rPr>
+              <a:t>  x</a:t>
+            </a:r>
+            <a:r>
+              <a:rPr lang="en-US" baseline="-25000" dirty="0">
+                <a:sym typeface="Symbol"/>
+              </a:rPr>
+              <a:t>3</a:t>
+            </a:r>
+            <a:r>
+              <a:rPr lang="en-US" dirty="0">
+                <a:sym typeface="Symbol"/>
+              </a:rPr>
+              <a:t>)  x</a:t>
+            </a:r>
+            <a:r>
+              <a:rPr lang="en-US" baseline="-25000" dirty="0">
+                <a:sym typeface="Symbol"/>
+              </a:rPr>
+              <a:t>4</a:t>
+            </a:r>
+            <a:r>
+              <a:rPr lang="en-US" dirty="0">
+                <a:sym typeface="Symbol"/>
+              </a:rPr>
+              <a:t>))  x</a:t>
+            </a:r>
+            <a:r>
+              <a:rPr lang="en-US" baseline="-25000" dirty="0">
+                <a:sym typeface="Symbol"/>
+              </a:rPr>
+              <a:t>2</a:t>
+            </a:r>
+            <a:r>
+              <a:rPr lang="en-US" dirty="0">
+                <a:sym typeface="Symbol"/>
+              </a:rPr>
+              <a:t> </a:t>
+            </a:r>
+            <a:endParaRPr lang="en-US" dirty="0"/>
+          </a:p>
+          <a:p>
+            <a:pPr algn="just"/>
+            <a:endParaRPr lang="en-US" dirty="0"/>
+          </a:p>
+          <a:p>
+            <a:pPr algn="just"/>
+            <a:endParaRPr lang="en-US" dirty="0"/>
+          </a:p>
+          <a:p>
+            <a:pPr algn="just"/>
+            <a:r>
+              <a:rPr lang="en-US" dirty="0"/>
+              <a:t>We </a:t>
+            </a:r>
+            <a:r>
+              <a:rPr lang="en-US" i="1" dirty="0"/>
+              <a:t>parse</a:t>
+            </a:r>
+            <a:r>
+              <a:rPr lang="en-US" dirty="0"/>
+              <a:t> the expression into an expression tree</a:t>
+            </a:r>
+          </a:p>
+          <a:p>
+            <a:pPr lvl="1" algn="just"/>
+            <a:r>
+              <a:rPr lang="en-US" dirty="0"/>
+              <a:t>Standard Algorithm Applies</a:t>
+            </a:r>
+          </a:p>
+          <a:p>
+            <a:pPr algn="just"/>
+            <a:r>
+              <a:rPr lang="en-US" dirty="0"/>
+              <a:t>Since each operator (other than </a:t>
+            </a:r>
+            <a:r>
+              <a:rPr lang="en-US" dirty="0">
+                <a:sym typeface="Symbol"/>
+              </a:rPr>
+              <a:t></a:t>
+            </a:r>
+            <a:r>
+              <a:rPr lang="en-US" dirty="0"/>
+              <a:t>) is binary, it will be a binary tree</a:t>
+            </a:r>
+          </a:p>
+        </p:txBody>
+      </p:sp>
+      <p:pic>
+        <p:nvPicPr>
+          <p:cNvPr id="8" name="Content Placeholder 7" descr="cormen-fig-34-11.png"/>
+          <p:cNvPicPr>
+            <a:picLocks noGrp="1" noChangeAspect="1"/>
+          </p:cNvPicPr>
+          <p:nvPr>
+            <p:ph sz="quarter" idx="2"/>
+          </p:nvPr>
+        </p:nvPicPr>
+        <p:blipFill>
+          <a:blip r:embed="rId2" cstate="print"/>
+          <a:stretch>
+            <a:fillRect/>
+          </a:stretch>
+        </p:blipFill>
+        <p:spPr>
+          <a:xfrm>
+            <a:off x="7507097" y="2209800"/>
+            <a:ext cx="4041775" cy="3773725"/>
+          </a:xfrm>
+        </p:spPr>
+      </p:pic>
+    </p:spTree>
+    <p:extLst>
+      <p:ext uri="{BB962C8B-B14F-4D97-AF65-F5344CB8AC3E}">
+        <p14:creationId xmlns:p14="http://schemas.microsoft.com/office/powerpoint/2010/main" val="641961724"/>
+      </p:ext>
+    </p:extLst>
+  </p:cSld>
+  <p:clrMapOvr>
+    <a:masterClrMapping/>
+  </p:clrMapOvr>
+</p:sld>
+</file>
+
+<file path=ppt/slides/slide33.xml><?xml version="1.0" encoding="utf-8"?>
+<p:sld xmlns:a="http://schemas.openxmlformats.org/drawingml/2006/main" xmlns:r="http://schemas.openxmlformats.org/officeDocument/2006/relationships" xmlns:p="http://schemas.openxmlformats.org/presentationml/2006/main">
+  <p:cSld>
+    <p:spTree>
+      <p:nvGrpSpPr>
+        <p:cNvPr id="1" name=""/>
+        <p:cNvGrpSpPr/>
+        <p:nvPr/>
+      </p:nvGrpSpPr>
+      <p:grpSpPr>
+        <a:xfrm>
+          <a:off x="0" y="0"/>
+          <a:ext cx="0" cy="0"/>
+          <a:chOff x="0" y="0"/>
+          <a:chExt cx="0" cy="0"/>
+        </a:xfrm>
+      </p:grpSpPr>
+      <p:sp>
+        <p:nvSpPr>
+          <p:cNvPr id="5" name="Title 4"/>
+          <p:cNvSpPr>
+            <a:spLocks noGrp="1"/>
+          </p:cNvSpPr>
+          <p:nvPr>
+            <p:ph type="title"/>
+          </p:nvPr>
+        </p:nvSpPr>
+        <p:spPr/>
+        <p:txBody>
+          <a:bodyPr/>
+          <a:lstStyle/>
+          <a:p>
+            <a:r>
+              <a:rPr lang="en-US" dirty="0"/>
+              <a:t>Converting SAT to 3-SAT, step 2</a:t>
+            </a:r>
+          </a:p>
+        </p:txBody>
+      </p:sp>
+      <p:sp>
+        <p:nvSpPr>
+          <p:cNvPr id="4" name="Slide Number Placeholder 3"/>
+          <p:cNvSpPr>
+            <a:spLocks noGrp="1"/>
+          </p:cNvSpPr>
+          <p:nvPr>
+            <p:ph type="sldNum" sz="quarter" idx="12"/>
+          </p:nvPr>
+        </p:nvSpPr>
+        <p:spPr/>
+        <p:txBody>
+          <a:bodyPr/>
+          <a:lstStyle/>
+          <a:p>
+            <a:fld id="{A8D2B1A1-9A82-492A-87A6-500459A044C8}" type="slidenum">
+              <a:rPr lang="en-US" smtClean="0"/>
+              <a:pPr/>
+              <a:t>33</a:t>
             </a:fld>
             <a:endParaRPr lang="en-US"/>
           </a:p>
@@ -21427,7 +21559,7 @@
 </p:sld>
 </file>
 
-<file path=ppt/slides/slide33.xml><?xml version="1.0" encoding="utf-8"?>
+<file path=ppt/slides/slide34.xml><?xml version="1.0" encoding="utf-8"?>
 <p:sld xmlns:a="http://schemas.openxmlformats.org/drawingml/2006/main" xmlns:r="http://schemas.openxmlformats.org/officeDocument/2006/relationships" xmlns:p="http://schemas.openxmlformats.org/presentationml/2006/main">
   <p:cSld>
     <p:spTree>
@@ -21484,7 +21616,7 @@
             <a:fld id="{A8D2B1A1-9A82-492A-87A6-500459A044C8}" type="slidenum">
               <a:rPr lang="en-US" smtClean="0"/>
               <a:pPr/>
-              <a:t>33</a:t>
+              <a:t>34</a:t>
             </a:fld>
             <a:endParaRPr lang="en-US"/>
           </a:p>
@@ -22757,7 +22889,7 @@
 </p:sld>
 </file>
 
-<file path=ppt/slides/slide34.xml><?xml version="1.0" encoding="utf-8"?>
+<file path=ppt/slides/slide35.xml><?xml version="1.0" encoding="utf-8"?>
 <p:sld xmlns:a="http://schemas.openxmlformats.org/drawingml/2006/main" xmlns:r="http://schemas.openxmlformats.org/officeDocument/2006/relationships" xmlns:p="http://schemas.openxmlformats.org/presentationml/2006/main">
   <p:cSld>
     <p:spTree>
@@ -22815,7 +22947,7 @@
             <a:fld id="{A8D2B1A1-9A82-492A-87A6-500459A044C8}" type="slidenum">
               <a:rPr lang="en-US" smtClean="0"/>
               <a:pPr/>
-              <a:t>34</a:t>
+              <a:t>35</a:t>
             </a:fld>
             <a:endParaRPr lang="en-US"/>
           </a:p>
@@ -23800,7 +23932,7 @@
 </p:sld>
 </file>
 
-<file path=ppt/slides/slide35.xml><?xml version="1.0" encoding="utf-8"?>
+<file path=ppt/slides/slide36.xml><?xml version="1.0" encoding="utf-8"?>
 <p:sld xmlns:a="http://schemas.openxmlformats.org/drawingml/2006/main" xmlns:r="http://schemas.openxmlformats.org/officeDocument/2006/relationships" xmlns:p="http://schemas.openxmlformats.org/presentationml/2006/main">
   <p:cSld>
     <p:spTree>
@@ -23857,7 +23989,7 @@
             <a:fld id="{A8D2B1A1-9A82-492A-87A6-500459A044C8}" type="slidenum">
               <a:rPr lang="en-US" smtClean="0"/>
               <a:pPr/>
-              <a:t>35</a:t>
+              <a:t>36</a:t>
             </a:fld>
             <a:endParaRPr lang="en-US"/>
           </a:p>
@@ -24978,7 +25110,7 @@
 </p:sld>
 </file>
 
-<file path=ppt/slides/slide36.xml><?xml version="1.0" encoding="utf-8"?>
+<file path=ppt/slides/slide37.xml><?xml version="1.0" encoding="utf-8"?>
 <p:sld xmlns:a="http://schemas.openxmlformats.org/drawingml/2006/main" xmlns:r="http://schemas.openxmlformats.org/officeDocument/2006/relationships" xmlns:p="http://schemas.openxmlformats.org/presentationml/2006/main">
   <p:cSld>
     <p:spTree>
@@ -25036,7 +25168,7 @@
             <a:fld id="{A8D2B1A1-9A82-492A-87A6-500459A044C8}" type="slidenum">
               <a:rPr lang="en-US" smtClean="0"/>
               <a:pPr/>
-              <a:t>36</a:t>
+              <a:t>37</a:t>
             </a:fld>
             <a:endParaRPr lang="en-US"/>
           </a:p>
@@ -25300,7 +25432,7 @@
 </p:sld>
 </file>
 
-<file path=ppt/slides/slide37.xml><?xml version="1.0" encoding="utf-8"?>
+<file path=ppt/slides/slide38.xml><?xml version="1.0" encoding="utf-8"?>
 <p:sld xmlns:a="http://schemas.openxmlformats.org/drawingml/2006/main" xmlns:r="http://schemas.openxmlformats.org/officeDocument/2006/relationships" xmlns:p="http://schemas.openxmlformats.org/presentationml/2006/main">
   <p:cSld>
     <p:spTree>
@@ -25357,7 +25489,7 @@
             <a:fld id="{A8D2B1A1-9A82-492A-87A6-500459A044C8}" type="slidenum">
               <a:rPr lang="en-US" smtClean="0"/>
               <a:pPr/>
-              <a:t>37</a:t>
+              <a:t>38</a:t>
             </a:fld>
             <a:endParaRPr lang="en-US"/>
           </a:p>
@@ -25411,7 +25543,7 @@
 </p:sld>
 </file>
 
-<file path=ppt/slides/slide38.xml><?xml version="1.0" encoding="utf-8"?>
+<file path=ppt/slides/slide39.xml><?xml version="1.0" encoding="utf-8"?>
 <p:sld xmlns:a="http://schemas.openxmlformats.org/drawingml/2006/main" xmlns:r="http://schemas.openxmlformats.org/officeDocument/2006/relationships" xmlns:p="http://schemas.openxmlformats.org/presentationml/2006/main">
   <p:cSld>
     <p:spTree>
@@ -27155,115 +27287,6 @@
     <p:extLst>
       <p:ext uri="{BB962C8B-B14F-4D97-AF65-F5344CB8AC3E}">
         <p14:creationId xmlns:p14="http://schemas.microsoft.com/office/powerpoint/2010/main" val="3585888690"/>
-      </p:ext>
-    </p:extLst>
-  </p:cSld>
-  <p:clrMapOvr>
-    <a:masterClrMapping/>
-  </p:clrMapOvr>
-</p:sld>
-</file>
-
-<file path=ppt/slides/slide39.xml><?xml version="1.0" encoding="utf-8"?>
-<p:sld xmlns:a="http://schemas.openxmlformats.org/drawingml/2006/main" xmlns:r="http://schemas.openxmlformats.org/officeDocument/2006/relationships" xmlns:p="http://schemas.openxmlformats.org/presentationml/2006/main">
-  <p:cSld>
-    <p:spTree>
-      <p:nvGrpSpPr>
-        <p:cNvPr id="1" name=""/>
-        <p:cNvGrpSpPr/>
-        <p:nvPr/>
-      </p:nvGrpSpPr>
-      <p:grpSpPr>
-        <a:xfrm>
-          <a:off x="0" y="0"/>
-          <a:ext cx="0" cy="0"/>
-          <a:chOff x="0" y="0"/>
-          <a:chExt cx="0" cy="0"/>
-        </a:xfrm>
-      </p:grpSpPr>
-      <p:sp>
-        <p:nvSpPr>
-          <p:cNvPr id="2" name="Title 1">
-            <a:extLst>
-              <a:ext uri="{FF2B5EF4-FFF2-40B4-BE49-F238E27FC236}">
-                <a16:creationId xmlns:a16="http://schemas.microsoft.com/office/drawing/2014/main" id="{C30AE763-F4AB-9043-94F1-039891F72748}"/>
-              </a:ext>
-            </a:extLst>
-          </p:cNvPr>
-          <p:cNvSpPr>
-            <a:spLocks noGrp="1"/>
-          </p:cNvSpPr>
-          <p:nvPr>
-            <p:ph type="title"/>
-          </p:nvPr>
-        </p:nvSpPr>
-        <p:spPr/>
-        <p:txBody>
-          <a:bodyPr/>
-          <a:lstStyle/>
-          <a:p>
-            <a:endParaRPr lang="en-US"/>
-          </a:p>
-        </p:txBody>
-      </p:sp>
-      <p:sp>
-        <p:nvSpPr>
-          <p:cNvPr id="3" name="Content Placeholder 2">
-            <a:extLst>
-              <a:ext uri="{FF2B5EF4-FFF2-40B4-BE49-F238E27FC236}">
-                <a16:creationId xmlns:a16="http://schemas.microsoft.com/office/drawing/2014/main" id="{FFA1F2F1-2D56-9543-A86E-6C59BD4FAA75}"/>
-              </a:ext>
-            </a:extLst>
-          </p:cNvPr>
-          <p:cNvSpPr>
-            <a:spLocks noGrp="1"/>
-          </p:cNvSpPr>
-          <p:nvPr>
-            <p:ph idx="1"/>
-          </p:nvPr>
-        </p:nvSpPr>
-        <p:spPr/>
-        <p:txBody>
-          <a:bodyPr/>
-          <a:lstStyle/>
-          <a:p>
-            <a:endParaRPr lang="en-US"/>
-          </a:p>
-        </p:txBody>
-      </p:sp>
-      <p:sp>
-        <p:nvSpPr>
-          <p:cNvPr id="4" name="Slide Number Placeholder 3">
-            <a:extLst>
-              <a:ext uri="{FF2B5EF4-FFF2-40B4-BE49-F238E27FC236}">
-                <a16:creationId xmlns:a16="http://schemas.microsoft.com/office/drawing/2014/main" id="{24A4529D-355D-E541-A79F-491C57D5D540}"/>
-              </a:ext>
-            </a:extLst>
-          </p:cNvPr>
-          <p:cNvSpPr>
-            <a:spLocks noGrp="1"/>
-          </p:cNvSpPr>
-          <p:nvPr>
-            <p:ph type="sldNum" sz="quarter" idx="12"/>
-          </p:nvPr>
-        </p:nvSpPr>
-        <p:spPr/>
-        <p:txBody>
-          <a:bodyPr/>
-          <a:lstStyle/>
-          <a:p>
-            <a:fld id="{86BADE50-950A-4D58-BFB2-FA2C6A8B385D}" type="slidenum">
-              <a:rPr lang="en-US" smtClean="0"/>
-              <a:t>39</a:t>
-            </a:fld>
-            <a:endParaRPr lang="en-US"/>
-          </a:p>
-        </p:txBody>
-      </p:sp>
-    </p:spTree>
-    <p:extLst>
-      <p:ext uri="{BB962C8B-B14F-4D97-AF65-F5344CB8AC3E}">
-        <p14:creationId xmlns:p14="http://schemas.microsoft.com/office/powerpoint/2010/main" val="3407134460"/>
       </p:ext>
     </p:extLst>
   </p:cSld>
@@ -30184,6 +30207,115 @@
       </p:grpSpPr>
       <p:sp>
         <p:nvSpPr>
+          <p:cNvPr id="2" name="Title 1">
+            <a:extLst>
+              <a:ext uri="{FF2B5EF4-FFF2-40B4-BE49-F238E27FC236}">
+                <a16:creationId xmlns:a16="http://schemas.microsoft.com/office/drawing/2014/main" id="{C30AE763-F4AB-9043-94F1-039891F72748}"/>
+              </a:ext>
+            </a:extLst>
+          </p:cNvPr>
+          <p:cNvSpPr>
+            <a:spLocks noGrp="1"/>
+          </p:cNvSpPr>
+          <p:nvPr>
+            <p:ph type="title"/>
+          </p:nvPr>
+        </p:nvSpPr>
+        <p:spPr/>
+        <p:txBody>
+          <a:bodyPr/>
+          <a:lstStyle/>
+          <a:p>
+            <a:endParaRPr lang="en-US"/>
+          </a:p>
+        </p:txBody>
+      </p:sp>
+      <p:sp>
+        <p:nvSpPr>
+          <p:cNvPr id="3" name="Content Placeholder 2">
+            <a:extLst>
+              <a:ext uri="{FF2B5EF4-FFF2-40B4-BE49-F238E27FC236}">
+                <a16:creationId xmlns:a16="http://schemas.microsoft.com/office/drawing/2014/main" id="{FFA1F2F1-2D56-9543-A86E-6C59BD4FAA75}"/>
+              </a:ext>
+            </a:extLst>
+          </p:cNvPr>
+          <p:cNvSpPr>
+            <a:spLocks noGrp="1"/>
+          </p:cNvSpPr>
+          <p:nvPr>
+            <p:ph idx="1"/>
+          </p:nvPr>
+        </p:nvSpPr>
+        <p:spPr/>
+        <p:txBody>
+          <a:bodyPr/>
+          <a:lstStyle/>
+          <a:p>
+            <a:endParaRPr lang="en-US"/>
+          </a:p>
+        </p:txBody>
+      </p:sp>
+      <p:sp>
+        <p:nvSpPr>
+          <p:cNvPr id="4" name="Slide Number Placeholder 3">
+            <a:extLst>
+              <a:ext uri="{FF2B5EF4-FFF2-40B4-BE49-F238E27FC236}">
+                <a16:creationId xmlns:a16="http://schemas.microsoft.com/office/drawing/2014/main" id="{24A4529D-355D-E541-A79F-491C57D5D540}"/>
+              </a:ext>
+            </a:extLst>
+          </p:cNvPr>
+          <p:cNvSpPr>
+            <a:spLocks noGrp="1"/>
+          </p:cNvSpPr>
+          <p:nvPr>
+            <p:ph type="sldNum" sz="quarter" idx="12"/>
+          </p:nvPr>
+        </p:nvSpPr>
+        <p:spPr/>
+        <p:txBody>
+          <a:bodyPr/>
+          <a:lstStyle/>
+          <a:p>
+            <a:fld id="{86BADE50-950A-4D58-BFB2-FA2C6A8B385D}" type="slidenum">
+              <a:rPr lang="en-US" smtClean="0"/>
+              <a:t>40</a:t>
+            </a:fld>
+            <a:endParaRPr lang="en-US"/>
+          </a:p>
+        </p:txBody>
+      </p:sp>
+    </p:spTree>
+    <p:extLst>
+      <p:ext uri="{BB962C8B-B14F-4D97-AF65-F5344CB8AC3E}">
+        <p14:creationId xmlns:p14="http://schemas.microsoft.com/office/powerpoint/2010/main" val="3407134460"/>
+      </p:ext>
+    </p:extLst>
+  </p:cSld>
+  <p:clrMapOvr>
+    <a:masterClrMapping/>
+  </p:clrMapOvr>
+</p:sld>
+</file>
+
+<file path=ppt/slides/slide41.xml><?xml version="1.0" encoding="utf-8"?>
+<p:sld xmlns:a="http://schemas.openxmlformats.org/drawingml/2006/main" xmlns:r="http://schemas.openxmlformats.org/officeDocument/2006/relationships" xmlns:p="http://schemas.openxmlformats.org/presentationml/2006/main">
+  <p:cSld>
+    <p:spTree>
+      <p:nvGrpSpPr>
+        <p:cNvPr id="1" name=""/>
+        <p:cNvGrpSpPr/>
+        <p:nvPr/>
+      </p:nvGrpSpPr>
+      <p:grpSpPr>
+        <a:xfrm>
+          <a:off x="0" y="0"/>
+          <a:ext cx="0" cy="0"/>
+          <a:chOff x="0" y="0"/>
+          <a:chExt cx="0" cy="0"/>
+        </a:xfrm>
+      </p:grpSpPr>
+      <p:sp>
+        <p:nvSpPr>
           <p:cNvPr id="44035" name="Rectangle 2"/>
           <p:cNvSpPr>
             <a:spLocks noGrp="1" noChangeArrowheads="1"/>
@@ -30532,7 +30664,7 @@
 </p:sld>
 </file>
 
-<file path=ppt/slides/slide41.xml><?xml version="1.0" encoding="utf-8"?>
+<file path=ppt/slides/slide42.xml><?xml version="1.0" encoding="utf-8"?>
 <p:sld xmlns:a="http://schemas.openxmlformats.org/drawingml/2006/main" xmlns:r="http://schemas.openxmlformats.org/officeDocument/2006/relationships" xmlns:p="http://schemas.openxmlformats.org/presentationml/2006/main">
   <p:cSld>
     <p:spTree>
@@ -31739,8 +31871,8 @@
           </p:sp>
         </mc:Fallback>
       </mc:AlternateContent>
-      <mc:AlternateContent xmlns:mc="http://schemas.openxmlformats.org/markup-compatibility/2006" xmlns:a14="http://schemas.microsoft.com/office/drawing/2010/main">
-        <mc:Choice Requires="a14">
+      <mc:AlternateContent xmlns:mc="http://schemas.openxmlformats.org/markup-compatibility/2006">
+        <mc:Choice xmlns:a14="http://schemas.microsoft.com/office/drawing/2010/main" Requires="a14">
           <p:sp>
             <p:nvSpPr>
               <p:cNvPr id="3" name="Content Placeholder 2"/>
@@ -31871,19 +32003,22 @@
                     </m:r>
                   </m:oMath>
                 </a14:m>
-                <a:endParaRPr lang="en-US" dirty="0"/>
+                <a:r>
+                  <a:rPr lang="en-US" dirty="0"/>
+                  <a:t>; Keep node and edges removed</a:t>
+                </a:r>
               </a:p>
               <a:p>
                 <a:pPr lvl="1"/>
                 <a:r>
                   <a:rPr lang="en-US" dirty="0"/>
-                  <a:t>Else, it wasn’t</a:t>
+                  <a:t>Else, it wasn’t; Put node and edges back in</a:t>
                 </a:r>
               </a:p>
             </p:txBody>
           </p:sp>
         </mc:Choice>
-        <mc:Fallback xmlns="">
+        <mc:Fallback>
           <p:sp>
             <p:nvSpPr>
               <p:cNvPr id="3" name="Content Placeholder 2"/>
@@ -31898,7 +32033,7 @@
               <a:blipFill>
                 <a:blip r:embed="rId3"/>
                 <a:stretch>
-                  <a:fillRect l="-1387"/>
+                  <a:fillRect l="-1389"/>
                 </a:stretch>
               </a:blipFill>
             </p:spPr>
@@ -31940,8 +32075,8 @@
           </a:p>
         </p:txBody>
       </p:sp>
-      <mc:AlternateContent xmlns:mc="http://schemas.openxmlformats.org/markup-compatibility/2006" xmlns:a14="http://schemas.microsoft.com/office/drawing/2010/main">
-        <mc:Choice Requires="a14">
+      <mc:AlternateContent xmlns:mc="http://schemas.openxmlformats.org/markup-compatibility/2006">
+        <mc:Choice xmlns:a14="http://schemas.microsoft.com/office/drawing/2010/main" Requires="a14">
           <p:sp>
             <p:nvSpPr>
               <p:cNvPr id="5" name="Rounded Rectangular Callout 4">
@@ -31956,7 +32091,7 @@
             </p:nvSpPr>
             <p:spPr>
               <a:xfrm>
-                <a:off x="6705600" y="4800600"/>
+                <a:off x="8839200" y="4800600"/>
                 <a:ext cx="3352800" cy="1555751"/>
               </a:xfrm>
               <a:prstGeom prst="wedgeRoundRectCallout">
@@ -32008,7 +32143,7 @@
             </p:txBody>
           </p:sp>
         </mc:Choice>
-        <mc:Fallback xmlns="">
+        <mc:Fallback>
           <p:sp>
             <p:nvSpPr>
               <p:cNvPr id="5" name="Rounded Rectangular Callout 4">
@@ -32025,7 +32160,7 @@
             </p:nvSpPr>
             <p:spPr>
               <a:xfrm>
-                <a:off x="6705600" y="4800600"/>
+                <a:off x="8839200" y="4800600"/>
                 <a:ext cx="3352800" cy="1555751"/>
               </a:xfrm>
               <a:prstGeom prst="wedgeRoundRectCallout">
@@ -33357,7 +33492,7 @@
             <a:lstStyle/>
             <a:p>
               <a:pPr algn="ctr"/>
-              <a:endParaRPr lang="en-US"/>
+              <a:endParaRPr lang="en-US" dirty="0"/>
             </a:p>
           </p:txBody>
         </p:sp>
@@ -34937,8 +35072,8 @@
         </p:nvSpPr>
         <p:spPr>
           <a:xfrm>
-            <a:off x="8648700" y="1987672"/>
-            <a:ext cx="1066800" cy="461665"/>
+            <a:off x="8581147" y="2389379"/>
+            <a:ext cx="3018365" cy="1569660"/>
           </a:xfrm>
           <a:prstGeom prst="rect">
             <a:avLst/>
@@ -34954,6 +35089,16 @@
             <a:r>
               <a:rPr lang="en-US" sz="2400" dirty="0"/>
               <a:t>No!</a:t>
+            </a:r>
+            <a:br>
+              <a:rPr lang="en-US" sz="2400" dirty="0"/>
+            </a:br>
+            <a:br>
+              <a:rPr lang="en-US" sz="2400" dirty="0"/>
+            </a:br>
+            <a:r>
+              <a:rPr lang="en-US" sz="2400" i="1" dirty="0"/>
+              <a:t>This node is NOT in the vertex cover</a:t>
             </a:r>
           </a:p>
         </p:txBody>
@@ -35224,10 +35369,10 @@
         </p:nvGrpSpPr>
         <p:grpSpPr>
           <a:xfrm>
-            <a:off x="2181226" y="1481300"/>
-            <a:ext cx="5514975" cy="4914248"/>
-            <a:chOff x="657225" y="1481300"/>
-            <a:chExt cx="5514975" cy="4914248"/>
+            <a:off x="3349488" y="1481300"/>
+            <a:ext cx="4346713" cy="4914248"/>
+            <a:chOff x="1825487" y="1481300"/>
+            <a:chExt cx="4346713" cy="4914248"/>
           </a:xfrm>
         </p:grpSpPr>
         <p:cxnSp>
@@ -35326,100 +35471,6 @@
             <a:ln w="76200">
               <a:solidFill>
                 <a:schemeClr val="tx1"/>
-              </a:solidFill>
-            </a:ln>
-          </p:spPr>
-          <p:style>
-            <a:lnRef idx="1">
-              <a:schemeClr val="accent1"/>
-            </a:lnRef>
-            <a:fillRef idx="0">
-              <a:schemeClr val="accent1"/>
-            </a:fillRef>
-            <a:effectRef idx="0">
-              <a:schemeClr val="accent1"/>
-            </a:effectRef>
-            <a:fontRef idx="minor">
-              <a:schemeClr val="tx1"/>
-            </a:fontRef>
-          </p:style>
-        </p:cxnSp>
-        <p:cxnSp>
-          <p:nvCxnSpPr>
-            <p:cNvPr id="21" name="Straight Connector 20"/>
-            <p:cNvCxnSpPr>
-              <a:stCxn id="28" idx="2"/>
-              <a:endCxn id="10" idx="0"/>
-            </p:cNvCxnSpPr>
-            <p:nvPr/>
-          </p:nvCxnSpPr>
-          <p:spPr>
-            <a:xfrm>
-              <a:off x="885825" y="3032235"/>
-              <a:ext cx="1168262" cy="1692165"/>
-            </a:xfrm>
-            <a:prstGeom prst="line">
-              <a:avLst/>
-            </a:prstGeom>
-            <a:solidFill>
-              <a:schemeClr val="tx2">
-                <a:lumMod val="60000"/>
-                <a:lumOff val="40000"/>
-                <a:alpha val="60000"/>
-              </a:schemeClr>
-            </a:solidFill>
-            <a:ln w="76200">
-              <a:solidFill>
-                <a:schemeClr val="tx1">
-                  <a:alpha val="28000"/>
-                </a:schemeClr>
-              </a:solidFill>
-            </a:ln>
-          </p:spPr>
-          <p:style>
-            <a:lnRef idx="1">
-              <a:schemeClr val="accent1"/>
-            </a:lnRef>
-            <a:fillRef idx="0">
-              <a:schemeClr val="accent1"/>
-            </a:fillRef>
-            <a:effectRef idx="0">
-              <a:schemeClr val="accent1"/>
-            </a:effectRef>
-            <a:fontRef idx="minor">
-              <a:schemeClr val="tx1"/>
-            </a:fontRef>
-          </p:style>
-        </p:cxnSp>
-        <p:cxnSp>
-          <p:nvCxnSpPr>
-            <p:cNvPr id="37" name="Straight Connector 36"/>
-            <p:cNvCxnSpPr>
-              <a:stCxn id="28" idx="3"/>
-              <a:endCxn id="29" idx="1"/>
-            </p:cNvCxnSpPr>
-            <p:nvPr/>
-          </p:nvCxnSpPr>
-          <p:spPr>
-            <a:xfrm flipV="1">
-              <a:off x="1114425" y="2447104"/>
-              <a:ext cx="1734926" cy="356531"/>
-            </a:xfrm>
-            <a:prstGeom prst="line">
-              <a:avLst/>
-            </a:prstGeom>
-            <a:solidFill>
-              <a:schemeClr val="tx2">
-                <a:lumMod val="60000"/>
-                <a:lumOff val="40000"/>
-                <a:alpha val="60000"/>
-              </a:schemeClr>
-            </a:solidFill>
-            <a:ln w="76200">
-              <a:solidFill>
-                <a:schemeClr val="tx1">
-                  <a:alpha val="28000"/>
-                </a:schemeClr>
               </a:solidFill>
             </a:ln>
           </p:spPr>
@@ -36116,60 +36167,6 @@
         </p:sp>
         <p:sp>
           <p:nvSpPr>
-            <p:cNvPr id="28" name="Rectangle 27"/>
-            <p:cNvSpPr/>
-            <p:nvPr/>
-          </p:nvSpPr>
-          <p:spPr>
-            <a:xfrm>
-              <a:off x="657225" y="2575035"/>
-              <a:ext cx="457200" cy="457200"/>
-            </a:xfrm>
-            <a:prstGeom prst="rect">
-              <a:avLst/>
-            </a:prstGeom>
-            <a:solidFill>
-              <a:schemeClr val="tx2">
-                <a:lumMod val="60000"/>
-                <a:lumOff val="40000"/>
-                <a:alpha val="60000"/>
-              </a:schemeClr>
-            </a:solidFill>
-            <a:ln>
-              <a:solidFill>
-                <a:schemeClr val="tx1">
-                  <a:alpha val="28000"/>
-                </a:schemeClr>
-              </a:solidFill>
-            </a:ln>
-          </p:spPr>
-          <p:style>
-            <a:lnRef idx="2">
-              <a:schemeClr val="accent1">
-                <a:shade val="50000"/>
-              </a:schemeClr>
-            </a:lnRef>
-            <a:fillRef idx="1">
-              <a:schemeClr val="accent1"/>
-            </a:fillRef>
-            <a:effectRef idx="0">
-              <a:schemeClr val="accent1"/>
-            </a:effectRef>
-            <a:fontRef idx="minor">
-              <a:schemeClr val="lt1"/>
-            </a:fontRef>
-          </p:style>
-          <p:txBody>
-            <a:bodyPr rtlCol="0" anchor="ctr"/>
-            <a:lstStyle/>
-            <a:p>
-              <a:pPr algn="ctr"/>
-              <a:endParaRPr lang="en-US"/>
-            </a:p>
-          </p:txBody>
-        </p:sp>
-        <p:sp>
-          <p:nvSpPr>
             <p:cNvPr id="29" name="Rectangle 28"/>
             <p:cNvSpPr/>
             <p:nvPr/>
@@ -36216,7 +36213,10 @@
             <a:lstStyle/>
             <a:p>
               <a:pPr algn="ctr"/>
-              <a:endParaRPr lang="en-US"/>
+              <a:r>
+                <a:rPr lang="en-US" dirty="0"/>
+                <a:t>     </a:t>
+              </a:r>
             </a:p>
           </p:txBody>
         </p:sp>
@@ -36422,8 +36422,8 @@
         </p:nvSpPr>
         <p:spPr>
           <a:xfrm>
-            <a:off x="8648700" y="1987672"/>
-            <a:ext cx="1066800" cy="461665"/>
+            <a:off x="8628043" y="2614278"/>
+            <a:ext cx="3040600" cy="1569660"/>
           </a:xfrm>
           <a:prstGeom prst="rect">
             <a:avLst/>
@@ -36440,18 +36440,131 @@
               <a:rPr lang="en-US" sz="2400" dirty="0"/>
               <a:t>Yes!</a:t>
             </a:r>
+            <a:br>
+              <a:rPr lang="en-US" sz="2400" dirty="0"/>
+            </a:br>
+            <a:br>
+              <a:rPr lang="en-US" sz="2400" dirty="0"/>
+            </a:br>
+            <a:r>
+              <a:rPr lang="en-US" sz="2400" i="1" dirty="0"/>
+              <a:t>This node IS in the vertex cover</a:t>
+            </a:r>
           </a:p>
         </p:txBody>
       </p:sp>
+      <p:cxnSp>
+        <p:nvCxnSpPr>
+          <p:cNvPr id="33" name="Straight Connector 32">
+            <a:extLst>
+              <a:ext uri="{FF2B5EF4-FFF2-40B4-BE49-F238E27FC236}">
+                <a16:creationId xmlns:a16="http://schemas.microsoft.com/office/drawing/2014/main" id="{91B57E9D-2D35-9E4D-8BAB-77FC74D3018A}"/>
+              </a:ext>
+            </a:extLst>
+          </p:cNvPr>
+          <p:cNvCxnSpPr>
+            <a:stCxn id="35" idx="2"/>
+          </p:cNvCxnSpPr>
+          <p:nvPr/>
+        </p:nvCxnSpPr>
+        <p:spPr>
+          <a:xfrm>
+            <a:off x="2409826" y="3032235"/>
+            <a:ext cx="1168262" cy="1692165"/>
+          </a:xfrm>
+          <a:prstGeom prst="line">
+            <a:avLst/>
+          </a:prstGeom>
+          <a:ln w="76200">
+            <a:solidFill>
+              <a:schemeClr val="tx1"/>
+            </a:solidFill>
+          </a:ln>
+        </p:spPr>
+        <p:style>
+          <a:lnRef idx="1">
+            <a:schemeClr val="accent1"/>
+          </a:lnRef>
+          <a:fillRef idx="0">
+            <a:schemeClr val="accent1"/>
+          </a:fillRef>
+          <a:effectRef idx="0">
+            <a:schemeClr val="accent1"/>
+          </a:effectRef>
+          <a:fontRef idx="minor">
+            <a:schemeClr val="tx1"/>
+          </a:fontRef>
+        </p:style>
+      </p:cxnSp>
       <p:sp>
         <p:nvSpPr>
-          <p:cNvPr id="3" name="&quot;No&quot; Symbol 2"/>
+          <p:cNvPr id="35" name="Rectangle 34">
+            <a:extLst>
+              <a:ext uri="{FF2B5EF4-FFF2-40B4-BE49-F238E27FC236}">
+                <a16:creationId xmlns:a16="http://schemas.microsoft.com/office/drawing/2014/main" id="{41E87126-950B-244A-BEAD-0814ABEC16DE}"/>
+              </a:ext>
+            </a:extLst>
+          </p:cNvPr>
           <p:cNvSpPr/>
           <p:nvPr/>
         </p:nvSpPr>
         <p:spPr>
           <a:xfrm>
-            <a:off x="2055848" y="2451300"/>
+            <a:off x="2181226" y="2575035"/>
+            <a:ext cx="457200" cy="457200"/>
+          </a:xfrm>
+          <a:prstGeom prst="rect">
+            <a:avLst/>
+          </a:prstGeom>
+          <a:solidFill>
+            <a:schemeClr val="tx2">
+              <a:lumMod val="60000"/>
+              <a:lumOff val="40000"/>
+            </a:schemeClr>
+          </a:solidFill>
+          <a:ln>
+            <a:solidFill>
+              <a:schemeClr val="tx2">
+                <a:lumMod val="60000"/>
+                <a:lumOff val="40000"/>
+              </a:schemeClr>
+            </a:solidFill>
+          </a:ln>
+        </p:spPr>
+        <p:style>
+          <a:lnRef idx="2">
+            <a:schemeClr val="accent1">
+              <a:shade val="50000"/>
+            </a:schemeClr>
+          </a:lnRef>
+          <a:fillRef idx="1">
+            <a:schemeClr val="accent1"/>
+          </a:fillRef>
+          <a:effectRef idx="0">
+            <a:schemeClr val="accent1"/>
+          </a:effectRef>
+          <a:fontRef idx="minor">
+            <a:schemeClr val="lt1"/>
+          </a:fontRef>
+        </p:style>
+        <p:txBody>
+          <a:bodyPr rtlCol="0" anchor="ctr"/>
+          <a:lstStyle/>
+          <a:p>
+            <a:pPr algn="ctr"/>
+            <a:endParaRPr lang="en-US"/>
+          </a:p>
+        </p:txBody>
+      </p:sp>
+      <p:sp>
+        <p:nvSpPr>
+          <p:cNvPr id="32" name="&quot;No&quot; Symbol 31"/>
+          <p:cNvSpPr/>
+          <p:nvPr/>
+        </p:nvSpPr>
+        <p:spPr>
+          <a:xfrm>
+            <a:off x="4245045" y="2103860"/>
             <a:ext cx="707955" cy="707955"/>
           </a:xfrm>
           <a:prstGeom prst="noSmoking">
@@ -36499,62 +36612,56 @@
           </a:p>
         </p:txBody>
       </p:sp>
-      <p:sp>
-        <p:nvSpPr>
-          <p:cNvPr id="32" name="&quot;No&quot; Symbol 31"/>
-          <p:cNvSpPr/>
+      <p:cxnSp>
+        <p:nvCxnSpPr>
+          <p:cNvPr id="36" name="Straight Connector 35">
+            <a:extLst>
+              <a:ext uri="{FF2B5EF4-FFF2-40B4-BE49-F238E27FC236}">
+                <a16:creationId xmlns:a16="http://schemas.microsoft.com/office/drawing/2014/main" id="{BC17925C-3FA6-3D45-960C-D084C38A7450}"/>
+              </a:ext>
+            </a:extLst>
+          </p:cNvPr>
+          <p:cNvCxnSpPr/>
           <p:nvPr/>
-        </p:nvSpPr>
+        </p:nvCxnSpPr>
         <p:spPr>
-          <a:xfrm>
-            <a:off x="4247974" y="2100419"/>
-            <a:ext cx="707955" cy="707955"/>
+          <a:xfrm flipV="1">
+            <a:off x="2638426" y="2447104"/>
+            <a:ext cx="1734926" cy="356531"/>
           </a:xfrm>
-          <a:prstGeom prst="noSmoking">
-            <a:avLst>
-              <a:gd name="adj" fmla="val 9278"/>
-            </a:avLst>
+          <a:prstGeom prst="line">
+            <a:avLst/>
           </a:prstGeom>
           <a:solidFill>
-            <a:srgbClr val="FFFF00"/>
+            <a:schemeClr val="tx2">
+              <a:lumMod val="60000"/>
+              <a:lumOff val="40000"/>
+              <a:alpha val="60000"/>
+            </a:schemeClr>
           </a:solidFill>
-          <a:ln>
+          <a:ln w="76200">
             <a:solidFill>
-              <a:schemeClr val="accent6">
-                <a:lumMod val="75000"/>
+              <a:schemeClr val="tx1">
+                <a:alpha val="23000"/>
               </a:schemeClr>
             </a:solidFill>
           </a:ln>
         </p:spPr>
         <p:style>
-          <a:lnRef idx="2">
-            <a:schemeClr val="accent1">
-              <a:shade val="50000"/>
-            </a:schemeClr>
+          <a:lnRef idx="1">
+            <a:schemeClr val="accent1"/>
           </a:lnRef>
-          <a:fillRef idx="1">
+          <a:fillRef idx="0">
             <a:schemeClr val="accent1"/>
           </a:fillRef>
           <a:effectRef idx="0">
             <a:schemeClr val="accent1"/>
           </a:effectRef>
           <a:fontRef idx="minor">
-            <a:schemeClr val="lt1"/>
+            <a:schemeClr val="tx1"/>
           </a:fontRef>
         </p:style>
-        <p:txBody>
-          <a:bodyPr rtlCol="0" anchor="ctr"/>
-          <a:lstStyle/>
-          <a:p>
-            <a:pPr algn="ctr"/>
-            <a:endParaRPr lang="en-US">
-              <a:solidFill>
-                <a:schemeClr val="tx1"/>
-              </a:solidFill>
-            </a:endParaRPr>
-          </a:p>
-        </p:txBody>
-      </p:sp>
+      </p:cxnSp>
     </p:spTree>
     <p:extLst>
       <p:ext uri="{BB962C8B-B14F-4D97-AF65-F5344CB8AC3E}">

</xml_diff>